<commit_message>
update custom project program and presentation slides: almost completed
</commit_message>
<xml_diff>
--- a/COMP170_CustomProject-Presentation.pptx
+++ b/COMP170_CustomProject-Presentation.pptx
@@ -1,6 +1,6 @@
 
 <file path=ppt/presentation.xml><?xml version="1.0" encoding="utf-8"?>
-<p:presentation xmlns:a="http://schemas.openxmlformats.org/drawingml/2006/main" xmlns:r="http://schemas.openxmlformats.org/officeDocument/2006/relationships" xmlns:mc="http://schemas.openxmlformats.org/markup-compatibility/2006" xmlns:mv="urn:schemas-microsoft-com:mac:vml" xmlns:p="http://schemas.openxmlformats.org/presentationml/2006/main" xmlns:c="http://schemas.openxmlformats.org/drawingml/2006/chart" xmlns:dgm="http://schemas.openxmlformats.org/drawingml/2006/diagram" xmlns:o="urn:schemas-microsoft-com:office:office" xmlns:v="urn:schemas-microsoft-com:vml" xmlns:pvml="urn:schemas-microsoft-com:office:powerpoint" xmlns:com="http://schemas.openxmlformats.org/drawingml/2006/compatibility" xmlns:p14="http://schemas.microsoft.com/office/powerpoint/2010/main" xmlns:p15="http://schemas.microsoft.com/office/powerpoint/2012/main" autoCompressPictures="0" embedTrueTypeFonts="1" strictFirstAndLastChars="0" saveSubsetFonts="1">
+<p:presentation xmlns:a="http://schemas.openxmlformats.org/drawingml/2006/main" xmlns:r="http://schemas.openxmlformats.org/officeDocument/2006/relationships" xmlns:mc="http://schemas.openxmlformats.org/markup-compatibility/2006" xmlns:mv="urn:schemas-microsoft-com:mac:vml" xmlns:p="http://schemas.openxmlformats.org/presentationml/2006/main" xmlns:c="http://schemas.openxmlformats.org/drawingml/2006/chart" xmlns:dgm="http://schemas.openxmlformats.org/drawingml/2006/diagram" xmlns:o="urn:schemas-microsoft-com:office:office" xmlns:v="urn:schemas-microsoft-com:vml" xmlns:pvml="urn:schemas-microsoft-com:office:powerpoint" xmlns:com="http://schemas.openxmlformats.org/drawingml/2006/compatibility" xmlns:p14="http://schemas.microsoft.com/office/powerpoint/2010/main" xmlns:p15="http://schemas.microsoft.com/office/powerpoint/2012/main" autoCompressPictures="0" strictFirstAndLastChars="0" saveSubsetFonts="1">
   <p:sldMasterIdLst>
     <p:sldMasterId id="2147483660" r:id="rId3"/>
   </p:sldMasterIdLst>
@@ -13,15 +13,10 @@
     <p:sldId id="258" r:id="rId7"/>
     <p:sldId id="259" r:id="rId8"/>
     <p:sldId id="260" r:id="rId9"/>
+    <p:sldId id="261" r:id="rId10"/>
   </p:sldIdLst>
   <p:sldSz cy="6858000" cx="12192000"/>
   <p:notesSz cx="6858000" cy="9144000"/>
-  <p:embeddedFontLst>
-    <p:embeddedFont>
-      <p:font typeface="Permanent Marker"/>
-      <p:regular r:id="rId10"/>
-    </p:embeddedFont>
-  </p:embeddedFontLst>
   <p:defaultTextStyle>
     <a:defPPr lvl="0" marR="0" rtl="0" algn="l">
       <a:lnSpc>
@@ -1250,7 +1245,7 @@
         <p:spPr>
           <a:xfrm>
             <a:off x="685800" y="4400550"/>
-            <a:ext cx="5486400" cy="3600450"/>
+            <a:ext cx="5486400" cy="3600600"/>
           </a:xfrm>
           <a:prstGeom prst="rect">
             <a:avLst/>
@@ -1262,7 +1257,7 @@
           </a:bodyPr>
           <a:lstStyle/>
           <a:p>
-            <a:pPr lvl="0">
+            <a:pPr lvl="0" rtl="0">
               <a:spcBef>
                 <a:spcPts val="0"/>
               </a:spcBef>
@@ -1322,7 +1317,7 @@
   <p:cSld>
     <p:spTree>
       <p:nvGrpSpPr>
-        <p:cNvPr id="127" name="Shape 127"/>
+        <p:cNvPr id="137" name="Shape 137"/>
         <p:cNvGrpSpPr/>
         <p:nvPr/>
       </p:nvGrpSpPr>
@@ -1336,7 +1331,7 @@
       </p:grpSpPr>
       <p:sp>
         <p:nvSpPr>
-          <p:cNvPr id="128" name="Shape 128"/>
+          <p:cNvPr id="138" name="Shape 138"/>
           <p:cNvSpPr txBox="1"/>
           <p:nvPr>
             <p:ph idx="1" type="body"/>
@@ -1372,7 +1367,7 @@
       </p:sp>
       <p:sp>
         <p:nvSpPr>
-          <p:cNvPr id="129" name="Shape 129"/>
+          <p:cNvPr id="139" name="Shape 139"/>
           <p:cNvSpPr/>
           <p:nvPr>
             <p:ph idx="2" type="sldImg"/>
@@ -1417,7 +1412,7 @@
   <p:cSld>
     <p:spTree>
       <p:nvGrpSpPr>
-        <p:cNvPr id="132" name="Shape 132"/>
+        <p:cNvPr id="143" name="Shape 143"/>
         <p:cNvGrpSpPr/>
         <p:nvPr/>
       </p:nvGrpSpPr>
@@ -1431,7 +1426,7 @@
       </p:grpSpPr>
       <p:sp>
         <p:nvSpPr>
-          <p:cNvPr id="133" name="Shape 133"/>
+          <p:cNvPr id="144" name="Shape 144"/>
           <p:cNvSpPr txBox="1"/>
           <p:nvPr>
             <p:ph idx="1" type="body"/>
@@ -1467,7 +1462,7 @@
       </p:sp>
       <p:sp>
         <p:nvSpPr>
-          <p:cNvPr id="134" name="Shape 134"/>
+          <p:cNvPr id="145" name="Shape 145"/>
           <p:cNvSpPr/>
           <p:nvPr>
             <p:ph idx="2" type="sldImg"/>
@@ -1512,7 +1507,7 @@
   <p:cSld>
     <p:spTree>
       <p:nvGrpSpPr>
-        <p:cNvPr id="137" name="Shape 137"/>
+        <p:cNvPr id="149" name="Shape 149"/>
         <p:cNvGrpSpPr/>
         <p:nvPr/>
       </p:nvGrpSpPr>
@@ -1526,7 +1521,7 @@
       </p:grpSpPr>
       <p:sp>
         <p:nvSpPr>
-          <p:cNvPr id="138" name="Shape 138"/>
+          <p:cNvPr id="150" name="Shape 150"/>
           <p:cNvSpPr txBox="1"/>
           <p:nvPr>
             <p:ph idx="1" type="body"/>
@@ -1562,7 +1557,102 @@
       </p:sp>
       <p:sp>
         <p:nvSpPr>
-          <p:cNvPr id="139" name="Shape 139"/>
+          <p:cNvPr id="151" name="Shape 151"/>
+          <p:cNvSpPr/>
+          <p:nvPr>
+            <p:ph idx="2" type="sldImg"/>
+          </p:nvPr>
+        </p:nvSpPr>
+        <p:spPr>
+          <a:xfrm>
+            <a:off x="685800" y="1143000"/>
+            <a:ext cx="5486400" cy="3086100"/>
+          </a:xfrm>
+          <a:custGeom>
+            <a:pathLst>
+              <a:path extrusionOk="0" h="120000" w="120000">
+                <a:moveTo>
+                  <a:pt x="0" y="0"/>
+                </a:moveTo>
+                <a:lnTo>
+                  <a:pt x="120000" y="0"/>
+                </a:lnTo>
+                <a:lnTo>
+                  <a:pt x="120000" y="120000"/>
+                </a:lnTo>
+                <a:lnTo>
+                  <a:pt x="0" y="120000"/>
+                </a:lnTo>
+                <a:close/>
+              </a:path>
+            </a:pathLst>
+          </a:custGeom>
+        </p:spPr>
+      </p:sp>
+    </p:spTree>
+  </p:cSld>
+  <p:clrMapOvr>
+    <a:masterClrMapping/>
+  </p:clrMapOvr>
+</p:notes>
+</file>
+
+<file path=ppt/notesSlides/notesSlide6.xml><?xml version="1.0" encoding="utf-8"?>
+<p:notes xmlns:a="http://schemas.openxmlformats.org/drawingml/2006/main" xmlns:r="http://schemas.openxmlformats.org/officeDocument/2006/relationships" xmlns:mc="http://schemas.openxmlformats.org/markup-compatibility/2006" xmlns:mv="urn:schemas-microsoft-com:mac:vml" xmlns:p="http://schemas.openxmlformats.org/presentationml/2006/main" xmlns:c="http://schemas.openxmlformats.org/drawingml/2006/chart" xmlns:dgm="http://schemas.openxmlformats.org/drawingml/2006/diagram" xmlns:o="urn:schemas-microsoft-com:office:office" xmlns:v="urn:schemas-microsoft-com:vml" xmlns:pvml="urn:schemas-microsoft-com:office:powerpoint" xmlns:com="http://schemas.openxmlformats.org/drawingml/2006/compatibility" xmlns:p14="http://schemas.microsoft.com/office/powerpoint/2010/main" xmlns:p15="http://schemas.microsoft.com/office/powerpoint/2012/main" showMasterPhAnim="0" showMasterSp="0">
+  <p:cSld>
+    <p:spTree>
+      <p:nvGrpSpPr>
+        <p:cNvPr id="155" name="Shape 155"/>
+        <p:cNvGrpSpPr/>
+        <p:nvPr/>
+      </p:nvGrpSpPr>
+      <p:grpSpPr>
+        <a:xfrm>
+          <a:off x="0" y="0"/>
+          <a:ext cx="0" cy="0"/>
+          <a:chOff x="0" y="0"/>
+          <a:chExt cx="0" cy="0"/>
+        </a:xfrm>
+      </p:grpSpPr>
+      <p:sp>
+        <p:nvSpPr>
+          <p:cNvPr id="156" name="Shape 156"/>
+          <p:cNvSpPr txBox="1"/>
+          <p:nvPr>
+            <p:ph idx="1" type="body"/>
+          </p:nvPr>
+        </p:nvSpPr>
+        <p:spPr>
+          <a:xfrm>
+            <a:off x="685800" y="4400550"/>
+            <a:ext cx="5486400" cy="3600450"/>
+          </a:xfrm>
+          <a:prstGeom prst="rect">
+            <a:avLst/>
+          </a:prstGeom>
+        </p:spPr>
+        <p:txBody>
+          <a:bodyPr anchorCtr="0" anchor="t" bIns="91425" lIns="91425" rIns="91425" wrap="square" tIns="91425">
+            <a:noAutofit/>
+          </a:bodyPr>
+          <a:lstStyle/>
+          <a:p>
+            <a:pPr lvl="0">
+              <a:spcBef>
+                <a:spcPts val="0"/>
+              </a:spcBef>
+              <a:buNone/>
+            </a:pPr>
+            <a:r>
+              <a:t/>
+            </a:r>
+            <a:endParaRPr/>
+          </a:p>
+        </p:txBody>
+      </p:sp>
+      <p:sp>
+        <p:nvSpPr>
+          <p:cNvPr id="157" name="Shape 157"/>
           <p:cNvSpPr/>
           <p:nvPr>
             <p:ph idx="2" type="sldImg"/>
@@ -13507,8 +13597,8 @@
         </p:nvSpPr>
         <p:spPr>
           <a:xfrm>
-            <a:off x="2202150" y="2898150"/>
-            <a:ext cx="7787700" cy="1061700"/>
+            <a:off x="1780450" y="2652450"/>
+            <a:ext cx="8209500" cy="1553100"/>
           </a:xfrm>
           <a:prstGeom prst="rect">
             <a:avLst/>
@@ -13543,10 +13633,10 @@
                 <a:solidFill>
                   <a:schemeClr val="dk1"/>
                 </a:solidFill>
-                <a:latin typeface="Permanent Marker"/>
-                <a:ea typeface="Permanent Marker"/>
-                <a:cs typeface="Permanent Marker"/>
-                <a:sym typeface="Permanent Marker"/>
+                <a:latin typeface="Times New Roman"/>
+                <a:ea typeface="Times New Roman"/>
+                <a:cs typeface="Times New Roman"/>
+                <a:sym typeface="Times New Roman"/>
               </a:rPr>
               <a:t>CITE BEFORE YOU WRITE: </a:t>
             </a:r>
@@ -13555,10 +13645,10 @@
                 <a:solidFill>
                   <a:schemeClr val="dk1"/>
                 </a:solidFill>
-                <a:latin typeface="Permanent Marker"/>
-                <a:ea typeface="Permanent Marker"/>
-                <a:cs typeface="Permanent Marker"/>
-                <a:sym typeface="Permanent Marker"/>
+                <a:latin typeface="Times New Roman"/>
+                <a:ea typeface="Times New Roman"/>
+                <a:cs typeface="Times New Roman"/>
+                <a:sym typeface="Times New Roman"/>
               </a:rPr>
             </a:br>
             <a:r>
@@ -13566,10 +13656,10 @@
                 <a:solidFill>
                   <a:schemeClr val="dk1"/>
                 </a:solidFill>
-                <a:latin typeface="Permanent Marker"/>
-                <a:ea typeface="Permanent Marker"/>
-                <a:cs typeface="Permanent Marker"/>
-                <a:sym typeface="Permanent Marker"/>
+                <a:latin typeface="Times New Roman"/>
+                <a:ea typeface="Times New Roman"/>
+                <a:cs typeface="Times New Roman"/>
+                <a:sym typeface="Times New Roman"/>
               </a:rPr>
               <a:t>A JAVA CITATION GENERATOR</a:t>
             </a:r>
@@ -13760,7 +13850,7 @@
         <p:spPr>
           <a:xfrm>
             <a:off x="1104900" y="76200"/>
-            <a:ext cx="9980682" cy="1096962"/>
+            <a:ext cx="9980700" cy="1097100"/>
           </a:xfrm>
           <a:prstGeom prst="rect">
             <a:avLst/>
@@ -13795,16 +13885,381 @@
                 <a:solidFill>
                   <a:schemeClr val="dk1"/>
                 </a:solidFill>
-                <a:latin typeface="Permanent Marker"/>
-                <a:ea typeface="Permanent Marker"/>
-                <a:cs typeface="Permanent Marker"/>
-                <a:sym typeface="Permanent Marker"/>
+                <a:latin typeface="Times New Roman"/>
+                <a:ea typeface="Times New Roman"/>
+                <a:cs typeface="Times New Roman"/>
+                <a:sym typeface="Times New Roman"/>
               </a:rPr>
               <a:t>PROGRAM STRUCTURE</a:t>
             </a:r>
           </a:p>
         </p:txBody>
       </p:sp>
+      <p:sp>
+        <p:nvSpPr>
+          <p:cNvPr id="127" name="Shape 127"/>
+          <p:cNvSpPr txBox="1"/>
+          <p:nvPr/>
+        </p:nvSpPr>
+        <p:spPr>
+          <a:xfrm>
+            <a:off x="1104900" y="1536900"/>
+            <a:ext cx="2783700" cy="783000"/>
+          </a:xfrm>
+          <a:prstGeom prst="rect">
+            <a:avLst/>
+          </a:prstGeom>
+          <a:noFill/>
+          <a:ln>
+            <a:noFill/>
+          </a:ln>
+        </p:spPr>
+        <p:txBody>
+          <a:bodyPr anchorCtr="0" anchor="t" bIns="91425" lIns="91425" rIns="91425" wrap="square" tIns="91425">
+            <a:noAutofit/>
+          </a:bodyPr>
+          <a:lstStyle/>
+          <a:p>
+            <a:pPr lvl="0" algn="ctr">
+              <a:spcBef>
+                <a:spcPts val="0"/>
+              </a:spcBef>
+              <a:buNone/>
+            </a:pPr>
+            <a:r>
+              <a:rPr lang="en-US" sz="3600">
+                <a:latin typeface="Georgia"/>
+                <a:ea typeface="Georgia"/>
+                <a:cs typeface="Georgia"/>
+                <a:sym typeface="Georgia"/>
+              </a:rPr>
+              <a:t>MyCitations</a:t>
+            </a:r>
+          </a:p>
+        </p:txBody>
+      </p:sp>
+      <p:sp>
+        <p:nvSpPr>
+          <p:cNvPr id="128" name="Shape 128"/>
+          <p:cNvSpPr txBox="1"/>
+          <p:nvPr/>
+        </p:nvSpPr>
+        <p:spPr>
+          <a:xfrm>
+            <a:off x="3726300" y="3450775"/>
+            <a:ext cx="4372500" cy="783000"/>
+          </a:xfrm>
+          <a:prstGeom prst="rect">
+            <a:avLst/>
+          </a:prstGeom>
+          <a:noFill/>
+          <a:ln>
+            <a:noFill/>
+          </a:ln>
+        </p:spPr>
+        <p:txBody>
+          <a:bodyPr anchorCtr="0" anchor="t" bIns="91425" lIns="91425" rIns="91425" wrap="square" tIns="91425">
+            <a:noAutofit/>
+          </a:bodyPr>
+          <a:lstStyle/>
+          <a:p>
+            <a:pPr lvl="0" algn="ctr">
+              <a:spcBef>
+                <a:spcPts val="0"/>
+              </a:spcBef>
+              <a:buNone/>
+            </a:pPr>
+            <a:r>
+              <a:rPr lang="en-US" sz="3600">
+                <a:latin typeface="Georgia"/>
+                <a:ea typeface="Georgia"/>
+                <a:cs typeface="Georgia"/>
+                <a:sym typeface="Georgia"/>
+              </a:rPr>
+              <a:t>CitationGenerator</a:t>
+            </a:r>
+          </a:p>
+        </p:txBody>
+      </p:sp>
+      <p:sp>
+        <p:nvSpPr>
+          <p:cNvPr id="129" name="Shape 129"/>
+          <p:cNvSpPr txBox="1"/>
+          <p:nvPr/>
+        </p:nvSpPr>
+        <p:spPr>
+          <a:xfrm>
+            <a:off x="8098800" y="1536900"/>
+            <a:ext cx="2986800" cy="957000"/>
+          </a:xfrm>
+          <a:prstGeom prst="rect">
+            <a:avLst/>
+          </a:prstGeom>
+          <a:noFill/>
+          <a:ln>
+            <a:noFill/>
+          </a:ln>
+        </p:spPr>
+        <p:txBody>
+          <a:bodyPr anchorCtr="0" anchor="t" bIns="91425" lIns="91425" rIns="91425" wrap="square" tIns="91425">
+            <a:noAutofit/>
+          </a:bodyPr>
+          <a:lstStyle/>
+          <a:p>
+            <a:pPr lvl="0" algn="ctr">
+              <a:spcBef>
+                <a:spcPts val="0"/>
+              </a:spcBef>
+              <a:buNone/>
+            </a:pPr>
+            <a:r>
+              <a:rPr lang="en-US" sz="3600">
+                <a:latin typeface="Georgia"/>
+                <a:ea typeface="Georgia"/>
+                <a:cs typeface="Georgia"/>
+                <a:sym typeface="Georgia"/>
+              </a:rPr>
+              <a:t>Citation</a:t>
+            </a:r>
+          </a:p>
+        </p:txBody>
+      </p:sp>
+      <p:cxnSp>
+        <p:nvCxnSpPr>
+          <p:cNvPr id="130" name="Shape 130"/>
+          <p:cNvCxnSpPr/>
+          <p:nvPr/>
+        </p:nvCxnSpPr>
+        <p:spPr>
+          <a:xfrm rot="10800000">
+            <a:off x="5895150" y="4233775"/>
+            <a:ext cx="34800" cy="1304700"/>
+          </a:xfrm>
+          <a:prstGeom prst="straightConnector1">
+            <a:avLst/>
+          </a:prstGeom>
+          <a:noFill/>
+          <a:ln cap="flat" cmpd="sng" w="76200">
+            <a:solidFill>
+              <a:srgbClr val="FF0000"/>
+            </a:solidFill>
+            <a:prstDash val="solid"/>
+            <a:round/>
+            <a:headEnd len="lg" w="lg" type="none"/>
+            <a:tailEnd len="lg" w="lg" type="triangle"/>
+          </a:ln>
+        </p:spPr>
+      </p:cxnSp>
+      <p:sp>
+        <p:nvSpPr>
+          <p:cNvPr id="131" name="Shape 131"/>
+          <p:cNvSpPr txBox="1"/>
+          <p:nvPr/>
+        </p:nvSpPr>
+        <p:spPr>
+          <a:xfrm>
+            <a:off x="5302050" y="5538475"/>
+            <a:ext cx="1221000" cy="783000"/>
+          </a:xfrm>
+          <a:prstGeom prst="rect">
+            <a:avLst/>
+          </a:prstGeom>
+          <a:noFill/>
+          <a:ln>
+            <a:noFill/>
+          </a:ln>
+        </p:spPr>
+        <p:txBody>
+          <a:bodyPr anchorCtr="0" anchor="t" bIns="91425" lIns="91425" rIns="91425" wrap="square" tIns="91425">
+            <a:noAutofit/>
+          </a:bodyPr>
+          <a:lstStyle/>
+          <a:p>
+            <a:pPr lvl="0">
+              <a:spcBef>
+                <a:spcPts val="0"/>
+              </a:spcBef>
+              <a:buNone/>
+            </a:pPr>
+            <a:r>
+              <a:rPr lang="en-US" sz="3600">
+                <a:latin typeface="Times New Roman"/>
+                <a:ea typeface="Times New Roman"/>
+                <a:cs typeface="Times New Roman"/>
+                <a:sym typeface="Times New Roman"/>
+              </a:rPr>
+              <a:t>Main</a:t>
+            </a:r>
+          </a:p>
+        </p:txBody>
+      </p:sp>
+      <p:cxnSp>
+        <p:nvCxnSpPr>
+          <p:cNvPr id="132" name="Shape 132"/>
+          <p:cNvCxnSpPr/>
+          <p:nvPr/>
+        </p:nvCxnSpPr>
+        <p:spPr>
+          <a:xfrm rot="10800000">
+            <a:off x="2479300" y="2319850"/>
+            <a:ext cx="217500" cy="1275900"/>
+          </a:xfrm>
+          <a:prstGeom prst="straightConnector1">
+            <a:avLst/>
+          </a:prstGeom>
+          <a:noFill/>
+          <a:ln cap="flat" cmpd="sng" w="76200">
+            <a:solidFill>
+              <a:srgbClr val="FF0000"/>
+            </a:solidFill>
+            <a:prstDash val="solid"/>
+            <a:round/>
+            <a:headEnd len="lg" w="lg" type="none"/>
+            <a:tailEnd len="lg" w="lg" type="triangle"/>
+          </a:ln>
+        </p:spPr>
+      </p:cxnSp>
+      <p:cxnSp>
+        <p:nvCxnSpPr>
+          <p:cNvPr id="133" name="Shape 133"/>
+          <p:cNvCxnSpPr/>
+          <p:nvPr/>
+        </p:nvCxnSpPr>
+        <p:spPr>
+          <a:xfrm flipH="1" rot="10800000">
+            <a:off x="9380825" y="2305450"/>
+            <a:ext cx="208500" cy="1304700"/>
+          </a:xfrm>
+          <a:prstGeom prst="straightConnector1">
+            <a:avLst/>
+          </a:prstGeom>
+          <a:noFill/>
+          <a:ln cap="flat" cmpd="sng" w="76200">
+            <a:solidFill>
+              <a:srgbClr val="FF0000"/>
+            </a:solidFill>
+            <a:prstDash val="solid"/>
+            <a:round/>
+            <a:headEnd len="lg" w="lg" type="none"/>
+            <a:tailEnd len="lg" w="lg" type="triangle"/>
+          </a:ln>
+        </p:spPr>
+      </p:cxnSp>
+      <p:sp>
+        <p:nvSpPr>
+          <p:cNvPr id="134" name="Shape 134"/>
+          <p:cNvSpPr txBox="1"/>
+          <p:nvPr/>
+        </p:nvSpPr>
+        <p:spPr>
+          <a:xfrm>
+            <a:off x="1529650" y="3682725"/>
+            <a:ext cx="2116800" cy="652500"/>
+          </a:xfrm>
+          <a:prstGeom prst="rect">
+            <a:avLst/>
+          </a:prstGeom>
+          <a:noFill/>
+          <a:ln>
+            <a:noFill/>
+          </a:ln>
+        </p:spPr>
+        <p:txBody>
+          <a:bodyPr anchorCtr="0" anchor="t" bIns="91425" lIns="91425" rIns="91425" wrap="square" tIns="91425">
+            <a:noAutofit/>
+          </a:bodyPr>
+          <a:lstStyle/>
+          <a:p>
+            <a:pPr lvl="0" algn="ctr">
+              <a:spcBef>
+                <a:spcPts val="0"/>
+              </a:spcBef>
+              <a:buNone/>
+            </a:pPr>
+            <a:r>
+              <a:rPr lang="en-US" sz="1800">
+                <a:latin typeface="Times New Roman"/>
+                <a:ea typeface="Times New Roman"/>
+                <a:cs typeface="Times New Roman"/>
+                <a:sym typeface="Times New Roman"/>
+              </a:rPr>
+              <a:t>HTML and counts of citations</a:t>
+            </a:r>
+          </a:p>
+        </p:txBody>
+      </p:sp>
+      <p:sp>
+        <p:nvSpPr>
+          <p:cNvPr id="135" name="Shape 135"/>
+          <p:cNvSpPr txBox="1"/>
+          <p:nvPr/>
+        </p:nvSpPr>
+        <p:spPr>
+          <a:xfrm>
+            <a:off x="8426675" y="3682725"/>
+            <a:ext cx="2116800" cy="652500"/>
+          </a:xfrm>
+          <a:prstGeom prst="rect">
+            <a:avLst/>
+          </a:prstGeom>
+          <a:noFill/>
+          <a:ln>
+            <a:noFill/>
+          </a:ln>
+        </p:spPr>
+        <p:txBody>
+          <a:bodyPr anchorCtr="0" anchor="t" bIns="91425" lIns="91425" rIns="91425" wrap="square" tIns="91425">
+            <a:noAutofit/>
+          </a:bodyPr>
+          <a:lstStyle/>
+          <a:p>
+            <a:pPr lvl="0" rtl="0" algn="ctr">
+              <a:spcBef>
+                <a:spcPts val="0"/>
+              </a:spcBef>
+              <a:buNone/>
+            </a:pPr>
+            <a:r>
+              <a:rPr lang="en-US" sz="1800">
+                <a:latin typeface="Times New Roman"/>
+                <a:ea typeface="Times New Roman"/>
+                <a:cs typeface="Times New Roman"/>
+                <a:sym typeface="Times New Roman"/>
+              </a:rPr>
+              <a:t>Constructors and methods for citations </a:t>
+            </a:r>
+          </a:p>
+        </p:txBody>
+      </p:sp>
+      <p:cxnSp>
+        <p:nvCxnSpPr>
+          <p:cNvPr id="136" name="Shape 136"/>
+          <p:cNvCxnSpPr>
+            <a:stCxn id="127" idx="3"/>
+            <a:endCxn id="128" idx="0"/>
+          </p:cNvCxnSpPr>
+          <p:nvPr/>
+        </p:nvCxnSpPr>
+        <p:spPr>
+          <a:xfrm>
+            <a:off x="3888600" y="1928400"/>
+            <a:ext cx="2024100" cy="1522500"/>
+          </a:xfrm>
+          <a:prstGeom prst="straightConnector1">
+            <a:avLst/>
+          </a:prstGeom>
+          <a:noFill/>
+          <a:ln cap="flat" cmpd="sng" w="76200">
+            <a:solidFill>
+              <a:srgbClr val="FF0000"/>
+            </a:solidFill>
+            <a:prstDash val="solid"/>
+            <a:round/>
+            <a:headEnd len="lg" w="lg" type="none"/>
+            <a:tailEnd len="lg" w="lg" type="triangle"/>
+          </a:ln>
+        </p:spPr>
+      </p:cxnSp>
     </p:spTree>
   </p:cSld>
   <p:clrMapOvr>
@@ -13817,212 +14272,6 @@
 </file>
 
 <file path=ppt/slides/slide3.xml><?xml version="1.0" encoding="utf-8"?>
-<p:sld xmlns:a="http://schemas.openxmlformats.org/drawingml/2006/main" xmlns:r="http://schemas.openxmlformats.org/officeDocument/2006/relationships" xmlns:mc="http://schemas.openxmlformats.org/markup-compatibility/2006" xmlns:mv="urn:schemas-microsoft-com:mac:vml" xmlns:p="http://schemas.openxmlformats.org/presentationml/2006/main" xmlns:c="http://schemas.openxmlformats.org/drawingml/2006/chart" xmlns:dgm="http://schemas.openxmlformats.org/drawingml/2006/diagram" xmlns:o="urn:schemas-microsoft-com:office:office" xmlns:v="urn:schemas-microsoft-com:vml" xmlns:pvml="urn:schemas-microsoft-com:office:powerpoint" xmlns:com="http://schemas.openxmlformats.org/drawingml/2006/compatibility" xmlns:p14="http://schemas.microsoft.com/office/powerpoint/2010/main" xmlns:p15="http://schemas.microsoft.com/office/powerpoint/2012/main">
-  <p:cSld>
-    <p:spTree>
-      <p:nvGrpSpPr>
-        <p:cNvPr id="130" name="Shape 130"/>
-        <p:cNvGrpSpPr/>
-        <p:nvPr/>
-      </p:nvGrpSpPr>
-      <p:grpSpPr>
-        <a:xfrm>
-          <a:off x="0" y="0"/>
-          <a:ext cx="0" cy="0"/>
-          <a:chOff x="0" y="0"/>
-          <a:chExt cx="0" cy="0"/>
-        </a:xfrm>
-      </p:grpSpPr>
-      <p:sp>
-        <p:nvSpPr>
-          <p:cNvPr id="131" name="Shape 131"/>
-          <p:cNvSpPr txBox="1"/>
-          <p:nvPr>
-            <p:ph type="title"/>
-          </p:nvPr>
-        </p:nvSpPr>
-        <p:spPr>
-          <a:xfrm>
-            <a:off x="1104900" y="76200"/>
-            <a:ext cx="9980682" cy="1096962"/>
-          </a:xfrm>
-          <a:prstGeom prst="rect">
-            <a:avLst/>
-          </a:prstGeom>
-          <a:noFill/>
-          <a:ln>
-            <a:noFill/>
-          </a:ln>
-        </p:spPr>
-        <p:txBody>
-          <a:bodyPr anchorCtr="0" anchor="b" bIns="45700" lIns="0" rIns="0" wrap="square" tIns="45700">
-            <a:noAutofit/>
-          </a:bodyPr>
-          <a:lstStyle/>
-          <a:p>
-            <a:pPr indent="-279400" lvl="0" marL="0" marR="0" rtl="0" algn="ctr">
-              <a:lnSpc>
-                <a:spcPct val="90000"/>
-              </a:lnSpc>
-              <a:spcBef>
-                <a:spcPts val="0"/>
-              </a:spcBef>
-              <a:buClr>
-                <a:schemeClr val="dk1"/>
-              </a:buClr>
-              <a:buSzPts val="4400"/>
-              <a:buFont typeface="Bad Script"/>
-              <a:buNone/>
-            </a:pPr>
-            <a:r>
-              <a:rPr i="0" lang="en-US" sz="4400" u="none" cap="none" strike="noStrike">
-                <a:solidFill>
-                  <a:schemeClr val="dk1"/>
-                </a:solidFill>
-                <a:latin typeface="Permanent Marker"/>
-                <a:ea typeface="Permanent Marker"/>
-                <a:cs typeface="Permanent Marker"/>
-                <a:sym typeface="Permanent Marker"/>
-              </a:rPr>
-              <a:t>TESTING &amp;</a:t>
-            </a:r>
-            <a:r>
-              <a:rPr lang="en-US" sz="3000">
-                <a:latin typeface="Permanent Marker"/>
-                <a:ea typeface="Permanent Marker"/>
-                <a:cs typeface="Permanent Marker"/>
-                <a:sym typeface="Permanent Marker"/>
-              </a:rPr>
-              <a:t> </a:t>
-            </a:r>
-            <a:br>
-              <a:rPr lang="en-US" sz="3000">
-                <a:latin typeface="Permanent Marker"/>
-                <a:ea typeface="Permanent Marker"/>
-                <a:cs typeface="Permanent Marker"/>
-                <a:sym typeface="Permanent Marker"/>
-              </a:rPr>
-            </a:br>
-            <a:r>
-              <a:rPr lang="en-US" sz="3000">
-                <a:latin typeface="Permanent Marker"/>
-                <a:ea typeface="Permanent Marker"/>
-                <a:cs typeface="Permanent Marker"/>
-                <a:sym typeface="Permanent Marker"/>
-              </a:rPr>
-              <a:t>KEY ISSUES WE ARE STILL WORKING ON</a:t>
-            </a:r>
-          </a:p>
-        </p:txBody>
-      </p:sp>
-    </p:spTree>
-  </p:cSld>
-  <p:clrMapOvr>
-    <a:masterClrMapping/>
-  </p:clrMapOvr>
-  <p:transition spd="slow">
-    <p:fade thruBlk="1"/>
-  </p:transition>
-</p:sld>
-</file>
-
-<file path=ppt/slides/slide4.xml><?xml version="1.0" encoding="utf-8"?>
-<p:sld xmlns:a="http://schemas.openxmlformats.org/drawingml/2006/main" xmlns:r="http://schemas.openxmlformats.org/officeDocument/2006/relationships" xmlns:mc="http://schemas.openxmlformats.org/markup-compatibility/2006" xmlns:mv="urn:schemas-microsoft-com:mac:vml" xmlns:p="http://schemas.openxmlformats.org/presentationml/2006/main" xmlns:c="http://schemas.openxmlformats.org/drawingml/2006/chart" xmlns:dgm="http://schemas.openxmlformats.org/drawingml/2006/diagram" xmlns:o="urn:schemas-microsoft-com:office:office" xmlns:v="urn:schemas-microsoft-com:vml" xmlns:pvml="urn:schemas-microsoft-com:office:powerpoint" xmlns:com="http://schemas.openxmlformats.org/drawingml/2006/compatibility" xmlns:p14="http://schemas.microsoft.com/office/powerpoint/2010/main" xmlns:p15="http://schemas.microsoft.com/office/powerpoint/2012/main">
-  <p:cSld>
-    <p:spTree>
-      <p:nvGrpSpPr>
-        <p:cNvPr id="135" name="Shape 135"/>
-        <p:cNvGrpSpPr/>
-        <p:nvPr/>
-      </p:nvGrpSpPr>
-      <p:grpSpPr>
-        <a:xfrm>
-          <a:off x="0" y="0"/>
-          <a:ext cx="0" cy="0"/>
-          <a:chOff x="0" y="0"/>
-          <a:chExt cx="0" cy="0"/>
-        </a:xfrm>
-      </p:grpSpPr>
-      <p:sp>
-        <p:nvSpPr>
-          <p:cNvPr id="136" name="Shape 136"/>
-          <p:cNvSpPr txBox="1"/>
-          <p:nvPr>
-            <p:ph type="title"/>
-          </p:nvPr>
-        </p:nvSpPr>
-        <p:spPr>
-          <a:xfrm>
-            <a:off x="1117963" y="0"/>
-            <a:ext cx="9980682" cy="1238477"/>
-          </a:xfrm>
-          <a:prstGeom prst="rect">
-            <a:avLst/>
-          </a:prstGeom>
-          <a:noFill/>
-          <a:ln>
-            <a:noFill/>
-          </a:ln>
-        </p:spPr>
-        <p:txBody>
-          <a:bodyPr anchorCtr="0" anchor="b" bIns="45700" lIns="0" rIns="0" wrap="square" tIns="45700">
-            <a:noAutofit/>
-          </a:bodyPr>
-          <a:lstStyle/>
-          <a:p>
-            <a:pPr indent="-251396" lvl="0" marL="0" marR="0" rtl="0" algn="ctr">
-              <a:lnSpc>
-                <a:spcPct val="90000"/>
-              </a:lnSpc>
-              <a:spcBef>
-                <a:spcPts val="0"/>
-              </a:spcBef>
-              <a:buClr>
-                <a:schemeClr val="dk1"/>
-              </a:buClr>
-              <a:buSzPts val="3959"/>
-              <a:buFont typeface="Bad Script"/>
-              <a:buNone/>
-            </a:pPr>
-            <a:r>
-              <a:rPr i="0" lang="en-US" sz="4400" u="none" cap="none" strike="noStrike">
-                <a:solidFill>
-                  <a:schemeClr val="dk1"/>
-                </a:solidFill>
-                <a:latin typeface="Permanent Marker"/>
-                <a:ea typeface="Permanent Marker"/>
-                <a:cs typeface="Permanent Marker"/>
-                <a:sym typeface="Permanent Marker"/>
-              </a:rPr>
-              <a:t>DEVIATIONS FROM PROPOSAL</a:t>
-            </a:r>
-            <a:r>
-              <a:rPr i="0" lang="en-US" sz="3000" u="none" cap="none" strike="noStrike">
-                <a:solidFill>
-                  <a:schemeClr val="dk1"/>
-                </a:solidFill>
-                <a:latin typeface="Permanent Marker"/>
-                <a:ea typeface="Permanent Marker"/>
-                <a:cs typeface="Permanent Marker"/>
-                <a:sym typeface="Permanent Marker"/>
-              </a:rPr>
-              <a:t> </a:t>
-            </a:r>
-          </a:p>
-        </p:txBody>
-      </p:sp>
-    </p:spTree>
-  </p:cSld>
-  <p:clrMapOvr>
-    <a:masterClrMapping/>
-  </p:clrMapOvr>
-  <p:transition spd="slow">
-    <p:fade thruBlk="1"/>
-  </p:transition>
-</p:sld>
-</file>
-
-<file path=ppt/slides/slide5.xml><?xml version="1.0" encoding="utf-8"?>
 <p:sld xmlns:a="http://schemas.openxmlformats.org/drawingml/2006/main" xmlns:r="http://schemas.openxmlformats.org/officeDocument/2006/relationships" xmlns:mc="http://schemas.openxmlformats.org/markup-compatibility/2006" xmlns:mv="urn:schemas-microsoft-com:mac:vml" xmlns:p="http://schemas.openxmlformats.org/presentationml/2006/main" xmlns:c="http://schemas.openxmlformats.org/drawingml/2006/chart" xmlns:dgm="http://schemas.openxmlformats.org/drawingml/2006/diagram" xmlns:o="urn:schemas-microsoft-com:office:office" xmlns:v="urn:schemas-microsoft-com:vml" xmlns:pvml="urn:schemas-microsoft-com:office:powerpoint" xmlns:com="http://schemas.openxmlformats.org/drawingml/2006/compatibility" xmlns:p14="http://schemas.microsoft.com/office/powerpoint/2010/main" xmlns:p15="http://schemas.microsoft.com/office/powerpoint/2012/main">
   <p:cSld>
     <p:spTree>
@@ -14085,13 +14334,946 @@
                 <a:solidFill>
                   <a:schemeClr val="dk1"/>
                 </a:solidFill>
-                <a:latin typeface="Permanent Marker"/>
-                <a:ea typeface="Permanent Marker"/>
-                <a:cs typeface="Permanent Marker"/>
-                <a:sym typeface="Permanent Marker"/>
+                <a:latin typeface="Times New Roman"/>
+                <a:ea typeface="Times New Roman"/>
+                <a:cs typeface="Times New Roman"/>
+                <a:sym typeface="Times New Roman"/>
+              </a:rPr>
+              <a:t>PROGRAM STRUCTURE</a:t>
+            </a:r>
+          </a:p>
+        </p:txBody>
+      </p:sp>
+      <p:sp>
+        <p:nvSpPr>
+          <p:cNvPr id="142" name="Shape 142"/>
+          <p:cNvSpPr txBox="1"/>
+          <p:nvPr/>
+        </p:nvSpPr>
+        <p:spPr>
+          <a:xfrm>
+            <a:off x="131875" y="1384800"/>
+            <a:ext cx="11919000" cy="5160000"/>
+          </a:xfrm>
+          <a:prstGeom prst="rect">
+            <a:avLst/>
+          </a:prstGeom>
+          <a:noFill/>
+          <a:ln>
+            <a:noFill/>
+          </a:ln>
+        </p:spPr>
+        <p:txBody>
+          <a:bodyPr anchorCtr="0" anchor="ctr" bIns="91425" lIns="91425" rIns="91425" wrap="square" tIns="91425">
+            <a:noAutofit/>
+          </a:bodyPr>
+          <a:lstStyle/>
+          <a:p>
+            <a:pPr indent="-381000" lvl="0" marL="457200">
+              <a:lnSpc>
+                <a:spcPct val="115000"/>
+              </a:lnSpc>
+              <a:spcBef>
+                <a:spcPts val="0"/>
+              </a:spcBef>
+              <a:spcAft>
+                <a:spcPts val="0"/>
+              </a:spcAft>
+              <a:buSzPts val="2400"/>
+              <a:buAutoNum type="arabicPeriod"/>
+            </a:pPr>
+            <a:r>
+              <a:rPr lang="en-US" sz="2400"/>
+              <a:t>In Main, u</a:t>
+            </a:r>
+            <a:r>
+              <a:rPr lang="en-US" sz="2400"/>
+              <a:t>ser chooses medium (book or website).</a:t>
+            </a:r>
+          </a:p>
+          <a:p>
+            <a:pPr indent="-381000" lvl="0" marL="457200" rtl="0">
+              <a:lnSpc>
+                <a:spcPct val="115000"/>
+              </a:lnSpc>
+              <a:spcBef>
+                <a:spcPts val="0"/>
+              </a:spcBef>
+              <a:spcAft>
+                <a:spcPts val="0"/>
+              </a:spcAft>
+              <a:buSzPts val="2400"/>
+              <a:buAutoNum type="arabicPeriod"/>
+            </a:pPr>
+            <a:r>
+              <a:rPr lang="en-US" sz="2400"/>
+              <a:t>In Main, user is asked to provide information necessary for the related medium’s constructor in the citation class (the information requested is based off of their initial source medium selection). </a:t>
+            </a:r>
+          </a:p>
+          <a:p>
+            <a:pPr indent="-381000" lvl="0" marL="457200" rtl="0">
+              <a:lnSpc>
+                <a:spcPct val="115000"/>
+              </a:lnSpc>
+              <a:spcBef>
+                <a:spcPts val="0"/>
+              </a:spcBef>
+              <a:spcAft>
+                <a:spcPts val="0"/>
+              </a:spcAft>
+              <a:buSzPts val="2400"/>
+              <a:buAutoNum type="arabicPeriod"/>
+            </a:pPr>
+            <a:r>
+              <a:rPr lang="en-US" sz="2400"/>
+              <a:t>Citation class methods get called in Main.</a:t>
+            </a:r>
+          </a:p>
+          <a:p>
+            <a:pPr indent="-381000" lvl="0" marL="457200" rtl="0">
+              <a:lnSpc>
+                <a:spcPct val="115000"/>
+              </a:lnSpc>
+              <a:spcBef>
+                <a:spcPts val="0"/>
+              </a:spcBef>
+              <a:spcAft>
+                <a:spcPts val="0"/>
+              </a:spcAft>
+              <a:buSzPts val="2400"/>
+              <a:buAutoNum type="arabicPeriod"/>
+            </a:pPr>
+            <a:r>
+              <a:rPr lang="en-US" sz="2400"/>
+              <a:t>Citations are organized into a string array in MyCitations class. </a:t>
+            </a:r>
+          </a:p>
+          <a:p>
+            <a:pPr indent="-381000" lvl="0" marL="457200" rtl="0">
+              <a:lnSpc>
+                <a:spcPct val="115000"/>
+              </a:lnSpc>
+              <a:spcBef>
+                <a:spcPts val="0"/>
+              </a:spcBef>
+              <a:spcAft>
+                <a:spcPts val="0"/>
+              </a:spcAft>
+              <a:buSzPts val="2400"/>
+              <a:buAutoNum type="arabicPeriod"/>
+            </a:pPr>
+            <a:r>
+              <a:rPr lang="en-US" sz="2400"/>
+              <a:t>In MyCitations class, the citations get exported to a HTML file.</a:t>
+            </a:r>
+          </a:p>
+          <a:p>
+            <a:pPr indent="-381000" lvl="0" marL="457200" rtl="0">
+              <a:lnSpc>
+                <a:spcPct val="115000"/>
+              </a:lnSpc>
+              <a:spcBef>
+                <a:spcPts val="0"/>
+              </a:spcBef>
+              <a:spcAft>
+                <a:spcPts val="0"/>
+              </a:spcAft>
+              <a:buSzPts val="2400"/>
+              <a:buAutoNum type="arabicPeriod"/>
+            </a:pPr>
+            <a:r>
+              <a:rPr lang="en-US" sz="2400"/>
+              <a:t>Main prints citation statistics (number of citations and number of each source medium cited) and provides name of HTML file to be found on user’s computer. </a:t>
+            </a:r>
+          </a:p>
+          <a:p>
+            <a:pPr indent="-381000" lvl="0" marL="457200">
+              <a:lnSpc>
+                <a:spcPct val="115000"/>
+              </a:lnSpc>
+              <a:spcBef>
+                <a:spcPts val="0"/>
+              </a:spcBef>
+              <a:buSzPts val="2400"/>
+              <a:buAutoNum type="arabicPeriod"/>
+            </a:pPr>
+            <a:r>
+              <a:rPr lang="en-US" sz="2400"/>
+              <a:t>Main uses a do while loop so that a user can decide to run the program multiple times in order to populate the HTML file with more citations. </a:t>
+            </a:r>
+          </a:p>
+          <a:p>
+            <a:pPr lvl="0">
+              <a:spcBef>
+                <a:spcPts val="0"/>
+              </a:spcBef>
+              <a:buNone/>
+            </a:pPr>
+            <a:r>
+              <a:t/>
+            </a:r>
+            <a:endParaRPr/>
+          </a:p>
+        </p:txBody>
+      </p:sp>
+    </p:spTree>
+  </p:cSld>
+  <p:clrMapOvr>
+    <a:masterClrMapping/>
+  </p:clrMapOvr>
+  <p:transition spd="slow">
+    <p:fade thruBlk="1"/>
+  </p:transition>
+</p:sld>
+</file>
+
+<file path=ppt/slides/slide4.xml><?xml version="1.0" encoding="utf-8"?>
+<p:sld xmlns:a="http://schemas.openxmlformats.org/drawingml/2006/main" xmlns:r="http://schemas.openxmlformats.org/officeDocument/2006/relationships" xmlns:mc="http://schemas.openxmlformats.org/markup-compatibility/2006" xmlns:mv="urn:schemas-microsoft-com:mac:vml" xmlns:p="http://schemas.openxmlformats.org/presentationml/2006/main" xmlns:c="http://schemas.openxmlformats.org/drawingml/2006/chart" xmlns:dgm="http://schemas.openxmlformats.org/drawingml/2006/diagram" xmlns:o="urn:schemas-microsoft-com:office:office" xmlns:v="urn:schemas-microsoft-com:vml" xmlns:pvml="urn:schemas-microsoft-com:office:powerpoint" xmlns:com="http://schemas.openxmlformats.org/drawingml/2006/compatibility" xmlns:p14="http://schemas.microsoft.com/office/powerpoint/2010/main" xmlns:p15="http://schemas.microsoft.com/office/powerpoint/2012/main">
+  <p:cSld>
+    <p:spTree>
+      <p:nvGrpSpPr>
+        <p:cNvPr id="146" name="Shape 146"/>
+        <p:cNvGrpSpPr/>
+        <p:nvPr/>
+      </p:nvGrpSpPr>
+      <p:grpSpPr>
+        <a:xfrm>
+          <a:off x="0" y="0"/>
+          <a:ext cx="0" cy="0"/>
+          <a:chOff x="0" y="0"/>
+          <a:chExt cx="0" cy="0"/>
+        </a:xfrm>
+      </p:grpSpPr>
+      <p:sp>
+        <p:nvSpPr>
+          <p:cNvPr id="147" name="Shape 147"/>
+          <p:cNvSpPr txBox="1"/>
+          <p:nvPr>
+            <p:ph type="title"/>
+          </p:nvPr>
+        </p:nvSpPr>
+        <p:spPr>
+          <a:xfrm>
+            <a:off x="1117963" y="0"/>
+            <a:ext cx="9980682" cy="1238477"/>
+          </a:xfrm>
+          <a:prstGeom prst="rect">
+            <a:avLst/>
+          </a:prstGeom>
+          <a:noFill/>
+          <a:ln>
+            <a:noFill/>
+          </a:ln>
+        </p:spPr>
+        <p:txBody>
+          <a:bodyPr anchorCtr="0" anchor="b" bIns="45700" lIns="0" rIns="0" wrap="square" tIns="45700">
+            <a:noAutofit/>
+          </a:bodyPr>
+          <a:lstStyle/>
+          <a:p>
+            <a:pPr indent="-251396" lvl="0" marL="0" marR="0" rtl="0" algn="ctr">
+              <a:lnSpc>
+                <a:spcPct val="90000"/>
+              </a:lnSpc>
+              <a:spcBef>
+                <a:spcPts val="0"/>
+              </a:spcBef>
+              <a:buClr>
+                <a:schemeClr val="dk1"/>
+              </a:buClr>
+              <a:buSzPts val="3959"/>
+              <a:buFont typeface="Bad Script"/>
+              <a:buNone/>
+            </a:pPr>
+            <a:r>
+              <a:rPr i="0" lang="en-US" sz="4400" u="none" cap="none" strike="noStrike">
+                <a:solidFill>
+                  <a:schemeClr val="dk1"/>
+                </a:solidFill>
+                <a:latin typeface="Times New Roman"/>
+                <a:ea typeface="Times New Roman"/>
+                <a:cs typeface="Times New Roman"/>
+                <a:sym typeface="Times New Roman"/>
+              </a:rPr>
+              <a:t>DEVIATIONS FROM PROPOSAL</a:t>
+            </a:r>
+            <a:r>
+              <a:rPr i="0" lang="en-US" sz="3000" u="none" cap="none" strike="noStrike">
+                <a:solidFill>
+                  <a:schemeClr val="dk1"/>
+                </a:solidFill>
+                <a:latin typeface="Times New Roman"/>
+                <a:ea typeface="Times New Roman"/>
+                <a:cs typeface="Times New Roman"/>
+                <a:sym typeface="Times New Roman"/>
+              </a:rPr>
+              <a:t> </a:t>
+            </a:r>
+          </a:p>
+        </p:txBody>
+      </p:sp>
+      <p:sp>
+        <p:nvSpPr>
+          <p:cNvPr id="148" name="Shape 148"/>
+          <p:cNvSpPr txBox="1"/>
+          <p:nvPr/>
+        </p:nvSpPr>
+        <p:spPr>
+          <a:xfrm>
+            <a:off x="-75" y="1574350"/>
+            <a:ext cx="12192000" cy="4863300"/>
+          </a:xfrm>
+          <a:prstGeom prst="rect">
+            <a:avLst/>
+          </a:prstGeom>
+          <a:noFill/>
+          <a:ln>
+            <a:noFill/>
+          </a:ln>
+        </p:spPr>
+        <p:txBody>
+          <a:bodyPr anchorCtr="0" anchor="ctr" bIns="91425" lIns="91425" rIns="91425" wrap="square" tIns="91425">
+            <a:noAutofit/>
+          </a:bodyPr>
+          <a:lstStyle/>
+          <a:p>
+            <a:pPr lvl="0" rtl="0">
+              <a:spcBef>
+                <a:spcPts val="0"/>
+              </a:spcBef>
+              <a:buNone/>
+            </a:pPr>
+            <a:r>
+              <a:rPr lang="en-US" sz="2000"/>
+              <a:t>Three</a:t>
+            </a:r>
+            <a:r>
+              <a:rPr lang="en-US" sz="2000"/>
+              <a:t> citation styles (MLA, CHICAGO, APA)</a:t>
+            </a:r>
+            <a:r>
+              <a:rPr b="1" lang="en-US" sz="2000"/>
+              <a:t> </a:t>
+            </a:r>
+            <a:r>
+              <a:rPr b="1" lang="en-US" sz="2000">
+                <a:solidFill>
+                  <a:srgbClr val="FF0000"/>
+                </a:solidFill>
+              </a:rPr>
+              <a:t>:</a:t>
+            </a:r>
+            <a:r>
+              <a:rPr b="1" lang="en-US" sz="2000"/>
+              <a:t> </a:t>
+            </a:r>
+            <a:r>
+              <a:rPr b="1" lang="en-US" sz="2400">
+                <a:solidFill>
+                  <a:srgbClr val="274E13"/>
+                </a:solidFill>
+              </a:rPr>
+              <a:t>Only MLA citation style</a:t>
+            </a:r>
+          </a:p>
+          <a:p>
+            <a:pPr lvl="0" rtl="0">
+              <a:spcBef>
+                <a:spcPts val="0"/>
+              </a:spcBef>
+              <a:buNone/>
+            </a:pPr>
+            <a:r>
+              <a:t/>
+            </a:r>
+            <a:endParaRPr b="1" sz="2000"/>
+          </a:p>
+          <a:p>
+            <a:pPr lvl="0" rtl="0">
+              <a:spcBef>
+                <a:spcPts val="0"/>
+              </a:spcBef>
+              <a:buNone/>
+            </a:pPr>
+            <a:r>
+              <a:t/>
+            </a:r>
+            <a:endParaRPr b="1" sz="2000"/>
+          </a:p>
+          <a:p>
+            <a:pPr lvl="0" rtl="0">
+              <a:spcBef>
+                <a:spcPts val="0"/>
+              </a:spcBef>
+              <a:buNone/>
+            </a:pPr>
+            <a:r>
+              <a:rPr lang="en-US" sz="2000"/>
+              <a:t>Source medium options - </a:t>
+            </a:r>
+            <a:r>
+              <a:rPr lang="en-US" sz="2000"/>
+              <a:t>book &gt; whole or section &gt; physical or online, journal &gt; whole or single article &gt; physical or online, website </a:t>
+            </a:r>
+            <a:r>
+              <a:rPr b="1" lang="en-US" sz="2000">
+                <a:solidFill>
+                  <a:srgbClr val="FF0000"/>
+                </a:solidFill>
+              </a:rPr>
+              <a:t>:</a:t>
+            </a:r>
+            <a:r>
+              <a:rPr b="1" lang="en-US" sz="2000"/>
+              <a:t> </a:t>
+            </a:r>
+            <a:r>
+              <a:rPr b="1" lang="en-US" sz="2400">
+                <a:solidFill>
+                  <a:srgbClr val="274E13"/>
+                </a:solidFill>
+              </a:rPr>
+              <a:t>Limited source mediums to physical book and website</a:t>
+            </a:r>
+          </a:p>
+          <a:p>
+            <a:pPr lvl="0" rtl="0">
+              <a:spcBef>
+                <a:spcPts val="0"/>
+              </a:spcBef>
+              <a:buNone/>
+            </a:pPr>
+            <a:r>
+              <a:t/>
+            </a:r>
+            <a:endParaRPr b="1" sz="2000">
+              <a:solidFill>
+                <a:srgbClr val="274E13"/>
+              </a:solidFill>
+            </a:endParaRPr>
+          </a:p>
+          <a:p>
+            <a:pPr lvl="0" rtl="0">
+              <a:spcBef>
+                <a:spcPts val="0"/>
+              </a:spcBef>
+              <a:buNone/>
+            </a:pPr>
+            <a:r>
+              <a:t/>
+            </a:r>
+            <a:endParaRPr b="1" sz="2000">
+              <a:solidFill>
+                <a:srgbClr val="274E13"/>
+              </a:solidFill>
+            </a:endParaRPr>
+          </a:p>
+          <a:p>
+            <a:pPr lvl="0" rtl="0">
+              <a:spcBef>
+                <a:spcPts val="0"/>
+              </a:spcBef>
+              <a:buNone/>
+            </a:pPr>
+            <a:r>
+              <a:rPr lang="en-US" sz="2000"/>
+              <a:t>A class for each citation style/medium</a:t>
+            </a:r>
+            <a:r>
+              <a:rPr b="1" lang="en-US" sz="2000">
+                <a:solidFill>
+                  <a:srgbClr val="274E13"/>
+                </a:solidFill>
+              </a:rPr>
+              <a:t> </a:t>
+            </a:r>
+            <a:r>
+              <a:rPr b="1" lang="en-US" sz="2000">
+                <a:solidFill>
+                  <a:srgbClr val="FF0000"/>
+                </a:solidFill>
+              </a:rPr>
+              <a:t>:</a:t>
+            </a:r>
+            <a:r>
+              <a:rPr b="1" lang="en-US" sz="2000">
+                <a:solidFill>
+                  <a:srgbClr val="274E13"/>
+                </a:solidFill>
+              </a:rPr>
+              <a:t> </a:t>
+            </a:r>
+            <a:r>
+              <a:rPr b="1" lang="en-US" sz="2400">
+                <a:solidFill>
+                  <a:srgbClr val="274E13"/>
+                </a:solidFill>
+              </a:rPr>
+              <a:t>Citation creation completed in a single class</a:t>
+            </a:r>
+          </a:p>
+          <a:p>
+            <a:pPr lvl="0" rtl="0">
+              <a:spcBef>
+                <a:spcPts val="0"/>
+              </a:spcBef>
+              <a:buNone/>
+            </a:pPr>
+            <a:r>
+              <a:t/>
+            </a:r>
+            <a:endParaRPr b="1" sz="2000"/>
+          </a:p>
+          <a:p>
+            <a:pPr lvl="0" rtl="0">
+              <a:spcBef>
+                <a:spcPts val="0"/>
+              </a:spcBef>
+              <a:buNone/>
+            </a:pPr>
+            <a:r>
+              <a:t/>
+            </a:r>
+            <a:endParaRPr b="1" sz="2000"/>
+          </a:p>
+          <a:p>
+            <a:pPr lvl="0" rtl="0">
+              <a:spcBef>
+                <a:spcPts val="0"/>
+              </a:spcBef>
+              <a:buNone/>
+            </a:pPr>
+            <a:r>
+              <a:rPr lang="en-US" sz="2000"/>
+              <a:t>Citation output in Main</a:t>
+            </a:r>
+            <a:r>
+              <a:rPr b="1" lang="en-US" sz="2000"/>
+              <a:t> </a:t>
+            </a:r>
+            <a:r>
+              <a:rPr b="1" lang="en-US" sz="2000">
+                <a:solidFill>
+                  <a:srgbClr val="FF0000"/>
+                </a:solidFill>
+              </a:rPr>
+              <a:t>:</a:t>
+            </a:r>
+            <a:r>
+              <a:rPr b="1" lang="en-US" sz="2000"/>
+              <a:t> </a:t>
+            </a:r>
+            <a:r>
+              <a:rPr b="1" lang="en-US" sz="2400">
+                <a:solidFill>
+                  <a:srgbClr val="274E13"/>
+                </a:solidFill>
+              </a:rPr>
+              <a:t>Citations output to HTML file</a:t>
+            </a:r>
+          </a:p>
+        </p:txBody>
+      </p:sp>
+    </p:spTree>
+  </p:cSld>
+  <p:clrMapOvr>
+    <a:masterClrMapping/>
+  </p:clrMapOvr>
+  <p:transition spd="slow">
+    <p:fade thruBlk="1"/>
+  </p:transition>
+</p:sld>
+</file>
+
+<file path=ppt/slides/slide5.xml><?xml version="1.0" encoding="utf-8"?>
+<p:sld xmlns:a="http://schemas.openxmlformats.org/drawingml/2006/main" xmlns:r="http://schemas.openxmlformats.org/officeDocument/2006/relationships" xmlns:mc="http://schemas.openxmlformats.org/markup-compatibility/2006" xmlns:mv="urn:schemas-microsoft-com:mac:vml" xmlns:p="http://schemas.openxmlformats.org/presentationml/2006/main" xmlns:c="http://schemas.openxmlformats.org/drawingml/2006/chart" xmlns:dgm="http://schemas.openxmlformats.org/drawingml/2006/diagram" xmlns:o="urn:schemas-microsoft-com:office:office" xmlns:v="urn:schemas-microsoft-com:vml" xmlns:pvml="urn:schemas-microsoft-com:office:powerpoint" xmlns:com="http://schemas.openxmlformats.org/drawingml/2006/compatibility" xmlns:p14="http://schemas.microsoft.com/office/powerpoint/2010/main" xmlns:p15="http://schemas.microsoft.com/office/powerpoint/2012/main">
+  <p:cSld>
+    <p:spTree>
+      <p:nvGrpSpPr>
+        <p:cNvPr id="152" name="Shape 152"/>
+        <p:cNvGrpSpPr/>
+        <p:nvPr/>
+      </p:nvGrpSpPr>
+      <p:grpSpPr>
+        <a:xfrm>
+          <a:off x="0" y="0"/>
+          <a:ext cx="0" cy="0"/>
+          <a:chOff x="0" y="0"/>
+          <a:chExt cx="0" cy="0"/>
+        </a:xfrm>
+      </p:grpSpPr>
+      <p:sp>
+        <p:nvSpPr>
+          <p:cNvPr id="153" name="Shape 153"/>
+          <p:cNvSpPr txBox="1"/>
+          <p:nvPr>
+            <p:ph type="title"/>
+          </p:nvPr>
+        </p:nvSpPr>
+        <p:spPr>
+          <a:xfrm>
+            <a:off x="1104900" y="76200"/>
+            <a:ext cx="9980700" cy="1097100"/>
+          </a:xfrm>
+          <a:prstGeom prst="rect">
+            <a:avLst/>
+          </a:prstGeom>
+          <a:noFill/>
+          <a:ln>
+            <a:noFill/>
+          </a:ln>
+        </p:spPr>
+        <p:txBody>
+          <a:bodyPr anchorCtr="0" anchor="b" bIns="45700" lIns="0" rIns="0" wrap="square" tIns="45700">
+            <a:noAutofit/>
+          </a:bodyPr>
+          <a:lstStyle/>
+          <a:p>
+            <a:pPr indent="-279400" lvl="0" marL="0" marR="0" rtl="0" algn="ctr">
+              <a:lnSpc>
+                <a:spcPct val="90000"/>
+              </a:lnSpc>
+              <a:spcBef>
+                <a:spcPts val="0"/>
+              </a:spcBef>
+              <a:buClr>
+                <a:schemeClr val="dk1"/>
+              </a:buClr>
+              <a:buSzPts val="4400"/>
+              <a:buFont typeface="Bad Script"/>
+              <a:buNone/>
+            </a:pPr>
+            <a:r>
+              <a:rPr i="0" lang="en-US" sz="4400" u="none" cap="none" strike="noStrike">
+                <a:solidFill>
+                  <a:schemeClr val="dk1"/>
+                </a:solidFill>
+                <a:latin typeface="Times New Roman"/>
+                <a:ea typeface="Times New Roman"/>
+                <a:cs typeface="Times New Roman"/>
+                <a:sym typeface="Times New Roman"/>
+              </a:rPr>
+              <a:t>TESTING &amp;</a:t>
+            </a:r>
+            <a:r>
+              <a:rPr lang="en-US" sz="4400">
+                <a:latin typeface="Times New Roman"/>
+                <a:ea typeface="Times New Roman"/>
+                <a:cs typeface="Times New Roman"/>
+                <a:sym typeface="Times New Roman"/>
+              </a:rPr>
+              <a:t> KEY ISSUES </a:t>
+            </a:r>
+          </a:p>
+        </p:txBody>
+      </p:sp>
+      <p:sp>
+        <p:nvSpPr>
+          <p:cNvPr id="154" name="Shape 154"/>
+          <p:cNvSpPr txBox="1"/>
+          <p:nvPr/>
+        </p:nvSpPr>
+        <p:spPr>
+          <a:xfrm>
+            <a:off x="1129050" y="1467225"/>
+            <a:ext cx="9933900" cy="5028000"/>
+          </a:xfrm>
+          <a:prstGeom prst="rect">
+            <a:avLst/>
+          </a:prstGeom>
+          <a:noFill/>
+          <a:ln>
+            <a:noFill/>
+          </a:ln>
+        </p:spPr>
+        <p:txBody>
+          <a:bodyPr anchorCtr="0" anchor="t" bIns="91425" lIns="91425" rIns="91425" wrap="square" tIns="91425">
+            <a:noAutofit/>
+          </a:bodyPr>
+          <a:lstStyle/>
+          <a:p>
+            <a:pPr lvl="0">
+              <a:spcBef>
+                <a:spcPts val="0"/>
+              </a:spcBef>
+              <a:buNone/>
+            </a:pPr>
+            <a:r>
+              <a:rPr lang="en-US" sz="2400"/>
+              <a:t>Testing…</a:t>
+            </a:r>
+          </a:p>
+          <a:p>
+            <a:pPr lvl="0">
+              <a:spcBef>
+                <a:spcPts val="0"/>
+              </a:spcBef>
+              <a:buNone/>
+            </a:pPr>
+            <a:r>
+              <a:rPr lang="en-US" sz="2400"/>
+              <a:t>	</a:t>
+            </a:r>
+          </a:p>
+          <a:p>
+            <a:pPr lvl="0">
+              <a:spcBef>
+                <a:spcPts val="0"/>
+              </a:spcBef>
+              <a:buNone/>
+            </a:pPr>
+            <a:r>
+              <a:t/>
+            </a:r>
+            <a:endParaRPr sz="2400"/>
+          </a:p>
+          <a:p>
+            <a:pPr lvl="0">
+              <a:spcBef>
+                <a:spcPts val="0"/>
+              </a:spcBef>
+              <a:buNone/>
+            </a:pPr>
+            <a:r>
+              <a:rPr lang="en-US" sz="2400"/>
+              <a:t>Key Issues</a:t>
+            </a:r>
+            <a:r>
+              <a:rPr lang="en-US" sz="2400"/>
+              <a:t>….</a:t>
+            </a:r>
+          </a:p>
+          <a:p>
+            <a:pPr indent="457200" lvl="0" rtl="0">
+              <a:spcBef>
+                <a:spcPts val="0"/>
+              </a:spcBef>
+              <a:buNone/>
+            </a:pPr>
+            <a:r>
+              <a:rPr lang="en-US" sz="2400"/>
+              <a:t>getting citations to appear in alphabetical order</a:t>
+            </a:r>
+          </a:p>
+          <a:p>
+            <a:pPr indent="457200" lvl="0" rtl="0">
+              <a:spcBef>
+                <a:spcPts val="0"/>
+              </a:spcBef>
+              <a:buNone/>
+            </a:pPr>
+            <a:r>
+              <a:rPr lang="en-US" sz="2400"/>
+              <a:t>ways to limit user input for date so user enters four-digit year</a:t>
+            </a:r>
+          </a:p>
+          <a:p>
+            <a:pPr lvl="0">
+              <a:spcBef>
+                <a:spcPts val="0"/>
+              </a:spcBef>
+              <a:buNone/>
+            </a:pPr>
+            <a:r>
+              <a:t/>
+            </a:r>
+            <a:endParaRPr/>
+          </a:p>
+        </p:txBody>
+      </p:sp>
+    </p:spTree>
+  </p:cSld>
+  <p:clrMapOvr>
+    <a:masterClrMapping/>
+  </p:clrMapOvr>
+  <p:transition spd="slow">
+    <p:fade thruBlk="1"/>
+  </p:transition>
+</p:sld>
+</file>
+
+<file path=ppt/slides/slide6.xml><?xml version="1.0" encoding="utf-8"?>
+<p:sld xmlns:a="http://schemas.openxmlformats.org/drawingml/2006/main" xmlns:r="http://schemas.openxmlformats.org/officeDocument/2006/relationships" xmlns:mc="http://schemas.openxmlformats.org/markup-compatibility/2006" xmlns:mv="urn:schemas-microsoft-com:mac:vml" xmlns:p="http://schemas.openxmlformats.org/presentationml/2006/main" xmlns:c="http://schemas.openxmlformats.org/drawingml/2006/chart" xmlns:dgm="http://schemas.openxmlformats.org/drawingml/2006/diagram" xmlns:o="urn:schemas-microsoft-com:office:office" xmlns:v="urn:schemas-microsoft-com:vml" xmlns:pvml="urn:schemas-microsoft-com:office:powerpoint" xmlns:com="http://schemas.openxmlformats.org/drawingml/2006/compatibility" xmlns:p14="http://schemas.microsoft.com/office/powerpoint/2010/main" xmlns:p15="http://schemas.microsoft.com/office/powerpoint/2012/main">
+  <p:cSld>
+    <p:spTree>
+      <p:nvGrpSpPr>
+        <p:cNvPr id="158" name="Shape 158"/>
+        <p:cNvGrpSpPr/>
+        <p:nvPr/>
+      </p:nvGrpSpPr>
+      <p:grpSpPr>
+        <a:xfrm>
+          <a:off x="0" y="0"/>
+          <a:ext cx="0" cy="0"/>
+          <a:chOff x="0" y="0"/>
+          <a:chExt cx="0" cy="0"/>
+        </a:xfrm>
+      </p:grpSpPr>
+      <p:sp>
+        <p:nvSpPr>
+          <p:cNvPr id="159" name="Shape 159"/>
+          <p:cNvSpPr txBox="1"/>
+          <p:nvPr>
+            <p:ph type="title"/>
+          </p:nvPr>
+        </p:nvSpPr>
+        <p:spPr>
+          <a:xfrm>
+            <a:off x="1104900" y="76200"/>
+            <a:ext cx="9980682" cy="1096962"/>
+          </a:xfrm>
+          <a:prstGeom prst="rect">
+            <a:avLst/>
+          </a:prstGeom>
+          <a:noFill/>
+          <a:ln>
+            <a:noFill/>
+          </a:ln>
+        </p:spPr>
+        <p:txBody>
+          <a:bodyPr anchorCtr="0" anchor="b" bIns="45700" lIns="0" rIns="0" wrap="square" tIns="45700">
+            <a:noAutofit/>
+          </a:bodyPr>
+          <a:lstStyle/>
+          <a:p>
+            <a:pPr indent="-279400" lvl="0" marL="0" marR="0" rtl="0" algn="ctr">
+              <a:lnSpc>
+                <a:spcPct val="90000"/>
+              </a:lnSpc>
+              <a:spcBef>
+                <a:spcPts val="0"/>
+              </a:spcBef>
+              <a:buClr>
+                <a:schemeClr val="dk1"/>
+              </a:buClr>
+              <a:buSzPts val="4400"/>
+              <a:buFont typeface="Bad Script"/>
+              <a:buNone/>
+            </a:pPr>
+            <a:r>
+              <a:rPr i="0" lang="en-US" sz="4400" u="none" cap="none" strike="noStrike">
+                <a:solidFill>
+                  <a:schemeClr val="dk1"/>
+                </a:solidFill>
+                <a:latin typeface="Times New Roman"/>
+                <a:ea typeface="Times New Roman"/>
+                <a:cs typeface="Times New Roman"/>
+                <a:sym typeface="Times New Roman"/>
               </a:rPr>
               <a:t>WHAT WE HAVE LEARNED</a:t>
             </a:r>
+          </a:p>
+        </p:txBody>
+      </p:sp>
+      <p:sp>
+        <p:nvSpPr>
+          <p:cNvPr id="160" name="Shape 160"/>
+          <p:cNvSpPr txBox="1"/>
+          <p:nvPr/>
+        </p:nvSpPr>
+        <p:spPr>
+          <a:xfrm>
+            <a:off x="1071575" y="1813425"/>
+            <a:ext cx="9980700" cy="4286100"/>
+          </a:xfrm>
+          <a:prstGeom prst="rect">
+            <a:avLst/>
+          </a:prstGeom>
+          <a:noFill/>
+          <a:ln>
+            <a:noFill/>
+          </a:ln>
+        </p:spPr>
+        <p:txBody>
+          <a:bodyPr anchorCtr="0" anchor="t" bIns="91425" lIns="91425" rIns="91425" wrap="square" tIns="91425">
+            <a:noAutofit/>
+          </a:bodyPr>
+          <a:lstStyle/>
+          <a:p>
+            <a:pPr indent="-381000" lvl="0" marL="457200" rtl="0">
+              <a:spcBef>
+                <a:spcPts val="0"/>
+              </a:spcBef>
+              <a:buSzPts val="2400"/>
+              <a:buAutoNum type="arabicPeriod"/>
+            </a:pPr>
+            <a:r>
+              <a:rPr lang="en-US" sz="2400"/>
+              <a:t>Communication is key to group projects especially coding projects because all parts of a program are connected and reliant on each other. Pseudo-code and regular team meetings to discuss workflow expectations and alterations was key in completing this project. </a:t>
+            </a:r>
+          </a:p>
+          <a:p>
+            <a:pPr lvl="0" rtl="0">
+              <a:spcBef>
+                <a:spcPts val="0"/>
+              </a:spcBef>
+              <a:buNone/>
+            </a:pPr>
+            <a:r>
+              <a:t/>
+            </a:r>
+            <a:endParaRPr sz="2400"/>
+          </a:p>
+          <a:p>
+            <a:pPr indent="-381000" lvl="0" marL="457200" rtl="0">
+              <a:spcBef>
+                <a:spcPts val="0"/>
+              </a:spcBef>
+              <a:buSzPts val="2400"/>
+              <a:buAutoNum type="arabicPeriod"/>
+            </a:pPr>
+            <a:r>
+              <a:rPr lang="en-US" sz="2400"/>
+              <a:t>In the most basic sense, working on this project has distilled the many components of creating a basic java program that we have learned throughout this class. The key concepts of encapsulation, logical method usage, as well as class and object creation are all better understood by each of us now that we have worked on this joint program. </a:t>
+            </a:r>
+          </a:p>
+          <a:p>
+            <a:pPr lvl="0">
+              <a:spcBef>
+                <a:spcPts val="0"/>
+              </a:spcBef>
+              <a:buNone/>
+            </a:pPr>
+            <a:r>
+              <a:t/>
+            </a:r>
+            <a:endParaRPr sz="2400"/>
+          </a:p>
+          <a:p>
+            <a:pPr lvl="0">
+              <a:spcBef>
+                <a:spcPts val="0"/>
+              </a:spcBef>
+              <a:buNone/>
+            </a:pPr>
+            <a:r>
+              <a:rPr lang="en-US" sz="2400"/>
+              <a:t> </a:t>
+            </a:r>
+          </a:p>
+          <a:p>
+            <a:pPr lvl="0">
+              <a:spcBef>
+                <a:spcPts val="0"/>
+              </a:spcBef>
+              <a:buNone/>
+            </a:pPr>
+            <a:r>
+              <a:t/>
+            </a:r>
+            <a:endParaRPr sz="2400"/>
+          </a:p>
+          <a:p>
+            <a:pPr lvl="0">
+              <a:spcBef>
+                <a:spcPts val="0"/>
+              </a:spcBef>
+              <a:buNone/>
+            </a:pPr>
+            <a:r>
+              <a:t/>
+            </a:r>
+            <a:endParaRPr sz="2400"/>
           </a:p>
         </p:txBody>
       </p:sp>

</xml_diff>

<commit_message>
final touches to project code and presentation sllides (transferred back in pseudo code and disucussed key issues as well as final round of testing
</commit_message>
<xml_diff>
--- a/COMP170_CustomProject-Presentation.pptx
+++ b/COMP170_CustomProject-Presentation.pptx
@@ -14,6 +14,7 @@
     <p:sldId id="259" r:id="rId8"/>
     <p:sldId id="260" r:id="rId9"/>
     <p:sldId id="261" r:id="rId10"/>
+    <p:sldId id="262" r:id="rId11"/>
   </p:sldIdLst>
   <p:sldSz cy="6858000" cx="12192000"/>
   <p:notesSz cx="6858000" cy="9144000"/>
@@ -1257,7 +1258,7 @@
           </a:bodyPr>
           <a:lstStyle/>
           <a:p>
-            <a:pPr lvl="0" rtl="0">
+            <a:pPr indent="0" lvl="0" marL="0" rtl="0">
               <a:spcBef>
                 <a:spcPts val="0"/>
               </a:spcBef>
@@ -1317,7 +1318,7 @@
   <p:cSld>
     <p:spTree>
       <p:nvGrpSpPr>
-        <p:cNvPr id="137" name="Shape 137"/>
+        <p:cNvPr id="135" name="Shape 135"/>
         <p:cNvGrpSpPr/>
         <p:nvPr/>
       </p:nvGrpSpPr>
@@ -1331,7 +1332,7 @@
       </p:grpSpPr>
       <p:sp>
         <p:nvSpPr>
-          <p:cNvPr id="138" name="Shape 138"/>
+          <p:cNvPr id="136" name="Shape 136"/>
           <p:cNvSpPr txBox="1"/>
           <p:nvPr>
             <p:ph idx="1" type="body"/>
@@ -1352,7 +1353,7 @@
           </a:bodyPr>
           <a:lstStyle/>
           <a:p>
-            <a:pPr lvl="0">
+            <a:pPr indent="0" lvl="0" marL="0">
               <a:spcBef>
                 <a:spcPts val="0"/>
               </a:spcBef>
@@ -1367,7 +1368,7 @@
       </p:sp>
       <p:sp>
         <p:nvSpPr>
-          <p:cNvPr id="139" name="Shape 139"/>
+          <p:cNvPr id="137" name="Shape 137"/>
           <p:cNvSpPr/>
           <p:nvPr>
             <p:ph idx="2" type="sldImg"/>
@@ -1412,7 +1413,7 @@
   <p:cSld>
     <p:spTree>
       <p:nvGrpSpPr>
-        <p:cNvPr id="143" name="Shape 143"/>
+        <p:cNvPr id="141" name="Shape 141"/>
         <p:cNvGrpSpPr/>
         <p:nvPr/>
       </p:nvGrpSpPr>
@@ -1426,7 +1427,7 @@
       </p:grpSpPr>
       <p:sp>
         <p:nvSpPr>
-          <p:cNvPr id="144" name="Shape 144"/>
+          <p:cNvPr id="142" name="Shape 142"/>
           <p:cNvSpPr txBox="1"/>
           <p:nvPr>
             <p:ph idx="1" type="body"/>
@@ -1447,7 +1448,7 @@
           </a:bodyPr>
           <a:lstStyle/>
           <a:p>
-            <a:pPr lvl="0">
+            <a:pPr indent="0" lvl="0" marL="0">
               <a:spcBef>
                 <a:spcPts val="0"/>
               </a:spcBef>
@@ -1462,7 +1463,7 @@
       </p:sp>
       <p:sp>
         <p:nvSpPr>
-          <p:cNvPr id="145" name="Shape 145"/>
+          <p:cNvPr id="143" name="Shape 143"/>
           <p:cNvSpPr/>
           <p:nvPr>
             <p:ph idx="2" type="sldImg"/>
@@ -1507,7 +1508,7 @@
   <p:cSld>
     <p:spTree>
       <p:nvGrpSpPr>
-        <p:cNvPr id="149" name="Shape 149"/>
+        <p:cNvPr id="147" name="Shape 147"/>
         <p:cNvGrpSpPr/>
         <p:nvPr/>
       </p:nvGrpSpPr>
@@ -1521,7 +1522,7 @@
       </p:grpSpPr>
       <p:sp>
         <p:nvSpPr>
-          <p:cNvPr id="150" name="Shape 150"/>
+          <p:cNvPr id="148" name="Shape 148"/>
           <p:cNvSpPr txBox="1"/>
           <p:nvPr>
             <p:ph idx="1" type="body"/>
@@ -1542,7 +1543,7 @@
           </a:bodyPr>
           <a:lstStyle/>
           <a:p>
-            <a:pPr lvl="0">
+            <a:pPr indent="0" lvl="0" marL="0">
               <a:spcBef>
                 <a:spcPts val="0"/>
               </a:spcBef>
@@ -1557,7 +1558,7 @@
       </p:sp>
       <p:sp>
         <p:nvSpPr>
-          <p:cNvPr id="151" name="Shape 151"/>
+          <p:cNvPr id="149" name="Shape 149"/>
           <p:cNvSpPr/>
           <p:nvPr>
             <p:ph idx="2" type="sldImg"/>
@@ -1602,7 +1603,7 @@
   <p:cSld>
     <p:spTree>
       <p:nvGrpSpPr>
-        <p:cNvPr id="155" name="Shape 155"/>
+        <p:cNvPr id="154" name="Shape 154"/>
         <p:cNvGrpSpPr/>
         <p:nvPr/>
       </p:nvGrpSpPr>
@@ -1616,7 +1617,102 @@
       </p:grpSpPr>
       <p:sp>
         <p:nvSpPr>
+          <p:cNvPr id="155" name="Shape 155"/>
+          <p:cNvSpPr txBox="1"/>
+          <p:nvPr>
+            <p:ph idx="1" type="body"/>
+          </p:nvPr>
+        </p:nvSpPr>
+        <p:spPr>
+          <a:xfrm>
+            <a:off x="685800" y="4400550"/>
+            <a:ext cx="5486400" cy="3600600"/>
+          </a:xfrm>
+          <a:prstGeom prst="rect">
+            <a:avLst/>
+          </a:prstGeom>
+        </p:spPr>
+        <p:txBody>
+          <a:bodyPr anchorCtr="0" anchor="t" bIns="91425" lIns="91425" rIns="91425" wrap="square" tIns="91425">
+            <a:noAutofit/>
+          </a:bodyPr>
+          <a:lstStyle/>
+          <a:p>
+            <a:pPr indent="0" lvl="0" marL="0" rtl="0">
+              <a:spcBef>
+                <a:spcPts val="0"/>
+              </a:spcBef>
+              <a:buNone/>
+            </a:pPr>
+            <a:r>
+              <a:t/>
+            </a:r>
+            <a:endParaRPr/>
+          </a:p>
+        </p:txBody>
+      </p:sp>
+      <p:sp>
+        <p:nvSpPr>
           <p:cNvPr id="156" name="Shape 156"/>
+          <p:cNvSpPr/>
+          <p:nvPr>
+            <p:ph idx="2" type="sldImg"/>
+          </p:nvPr>
+        </p:nvSpPr>
+        <p:spPr>
+          <a:xfrm>
+            <a:off x="685800" y="1143000"/>
+            <a:ext cx="5486400" cy="3086100"/>
+          </a:xfrm>
+          <a:custGeom>
+            <a:pathLst>
+              <a:path extrusionOk="0" h="120000" w="120000">
+                <a:moveTo>
+                  <a:pt x="0" y="0"/>
+                </a:moveTo>
+                <a:lnTo>
+                  <a:pt x="120000" y="0"/>
+                </a:lnTo>
+                <a:lnTo>
+                  <a:pt x="120000" y="120000"/>
+                </a:lnTo>
+                <a:lnTo>
+                  <a:pt x="0" y="120000"/>
+                </a:lnTo>
+                <a:close/>
+              </a:path>
+            </a:pathLst>
+          </a:custGeom>
+        </p:spPr>
+      </p:sp>
+    </p:spTree>
+  </p:cSld>
+  <p:clrMapOvr>
+    <a:masterClrMapping/>
+  </p:clrMapOvr>
+</p:notes>
+</file>
+
+<file path=ppt/notesSlides/notesSlide7.xml><?xml version="1.0" encoding="utf-8"?>
+<p:notes xmlns:a="http://schemas.openxmlformats.org/drawingml/2006/main" xmlns:r="http://schemas.openxmlformats.org/officeDocument/2006/relationships" xmlns:mc="http://schemas.openxmlformats.org/markup-compatibility/2006" xmlns:mv="urn:schemas-microsoft-com:mac:vml" xmlns:p="http://schemas.openxmlformats.org/presentationml/2006/main" xmlns:c="http://schemas.openxmlformats.org/drawingml/2006/chart" xmlns:dgm="http://schemas.openxmlformats.org/drawingml/2006/diagram" xmlns:o="urn:schemas-microsoft-com:office:office" xmlns:v="urn:schemas-microsoft-com:vml" xmlns:pvml="urn:schemas-microsoft-com:office:powerpoint" xmlns:com="http://schemas.openxmlformats.org/drawingml/2006/compatibility" xmlns:p14="http://schemas.microsoft.com/office/powerpoint/2010/main" xmlns:p15="http://schemas.microsoft.com/office/powerpoint/2012/main" showMasterPhAnim="0" showMasterSp="0">
+  <p:cSld>
+    <p:spTree>
+      <p:nvGrpSpPr>
+        <p:cNvPr id="160" name="Shape 160"/>
+        <p:cNvGrpSpPr/>
+        <p:nvPr/>
+      </p:nvGrpSpPr>
+      <p:grpSpPr>
+        <a:xfrm>
+          <a:off x="0" y="0"/>
+          <a:ext cx="0" cy="0"/>
+          <a:chOff x="0" y="0"/>
+          <a:chExt cx="0" cy="0"/>
+        </a:xfrm>
+      </p:grpSpPr>
+      <p:sp>
+        <p:nvSpPr>
+          <p:cNvPr id="161" name="Shape 161"/>
           <p:cNvSpPr txBox="1"/>
           <p:nvPr>
             <p:ph idx="1" type="body"/>
@@ -1637,7 +1733,7 @@
           </a:bodyPr>
           <a:lstStyle/>
           <a:p>
-            <a:pPr lvl="0">
+            <a:pPr indent="0" lvl="0" marL="0">
               <a:spcBef>
                 <a:spcPts val="0"/>
               </a:spcBef>
@@ -1652,7 +1748,7 @@
       </p:sp>
       <p:sp>
         <p:nvSpPr>
-          <p:cNvPr id="157" name="Shape 157"/>
+          <p:cNvPr id="162" name="Shape 162"/>
           <p:cNvSpPr/>
           <p:nvPr>
             <p:ph idx="2" type="sldImg"/>
@@ -13920,7 +14016,7 @@
           </a:bodyPr>
           <a:lstStyle/>
           <a:p>
-            <a:pPr lvl="0" algn="ctr">
+            <a:pPr indent="0" lvl="0" marL="0" algn="ctr">
               <a:spcBef>
                 <a:spcPts val="0"/>
               </a:spcBef>
@@ -13963,7 +14059,7 @@
           </a:bodyPr>
           <a:lstStyle/>
           <a:p>
-            <a:pPr lvl="0" algn="ctr">
+            <a:pPr indent="0" lvl="0" marL="0" algn="ctr">
               <a:spcBef>
                 <a:spcPts val="0"/>
               </a:spcBef>
@@ -13989,8 +14085,8 @@
         </p:nvSpPr>
         <p:spPr>
           <a:xfrm>
-            <a:off x="8098800" y="1536900"/>
-            <a:ext cx="2986800" cy="957000"/>
+            <a:off x="8728375" y="1536900"/>
+            <a:ext cx="1899300" cy="957000"/>
           </a:xfrm>
           <a:prstGeom prst="rect">
             <a:avLst/>
@@ -14006,7 +14102,7 @@
           </a:bodyPr>
           <a:lstStyle/>
           <a:p>
-            <a:pPr lvl="0" algn="ctr">
+            <a:pPr indent="0" lvl="0" marL="0" algn="ctr">
               <a:spcBef>
                 <a:spcPts val="0"/>
               </a:spcBef>
@@ -14024,16 +14120,61 @@
           </a:p>
         </p:txBody>
       </p:sp>
+      <p:sp>
+        <p:nvSpPr>
+          <p:cNvPr id="130" name="Shape 130"/>
+          <p:cNvSpPr txBox="1"/>
+          <p:nvPr/>
+        </p:nvSpPr>
+        <p:spPr>
+          <a:xfrm>
+            <a:off x="5566650" y="4233775"/>
+            <a:ext cx="691800" cy="507300"/>
+          </a:xfrm>
+          <a:prstGeom prst="rect">
+            <a:avLst/>
+          </a:prstGeom>
+          <a:noFill/>
+          <a:ln>
+            <a:noFill/>
+          </a:ln>
+        </p:spPr>
+        <p:txBody>
+          <a:bodyPr anchorCtr="0" anchor="t" bIns="91425" lIns="91425" rIns="91425" wrap="square" tIns="91425">
+            <a:noAutofit/>
+          </a:bodyPr>
+          <a:lstStyle/>
+          <a:p>
+            <a:pPr indent="0" lvl="0" marL="0">
+              <a:spcBef>
+                <a:spcPts val="0"/>
+              </a:spcBef>
+              <a:buNone/>
+            </a:pPr>
+            <a:r>
+              <a:rPr lang="en-US" sz="1800">
+                <a:latin typeface="Times New Roman"/>
+                <a:ea typeface="Times New Roman"/>
+                <a:cs typeface="Times New Roman"/>
+                <a:sym typeface="Times New Roman"/>
+              </a:rPr>
+              <a:t>Main</a:t>
+            </a:r>
+          </a:p>
+        </p:txBody>
+      </p:sp>
       <p:cxnSp>
         <p:nvCxnSpPr>
-          <p:cNvPr id="130" name="Shape 130"/>
-          <p:cNvCxnSpPr/>
+          <p:cNvPr id="131" name="Shape 131"/>
+          <p:cNvCxnSpPr>
+            <a:stCxn id="129" idx="1"/>
+          </p:cNvCxnSpPr>
           <p:nvPr/>
         </p:nvCxnSpPr>
         <p:spPr>
-          <a:xfrm rot="10800000">
-            <a:off x="5895150" y="4233775"/>
-            <a:ext cx="34800" cy="1304700"/>
+          <a:xfrm flipH="1">
+            <a:off x="7901875" y="2015400"/>
+            <a:ext cx="826500" cy="1435500"/>
           </a:xfrm>
           <a:prstGeom prst="straightConnector1">
             <a:avLst/>
@@ -14052,108 +14193,13 @@
       </p:cxnSp>
       <p:sp>
         <p:nvSpPr>
-          <p:cNvPr id="131" name="Shape 131"/>
+          <p:cNvPr id="132" name="Shape 132"/>
           <p:cNvSpPr txBox="1"/>
           <p:nvPr/>
         </p:nvSpPr>
         <p:spPr>
           <a:xfrm>
-            <a:off x="5302050" y="5538475"/>
-            <a:ext cx="1221000" cy="783000"/>
-          </a:xfrm>
-          <a:prstGeom prst="rect">
-            <a:avLst/>
-          </a:prstGeom>
-          <a:noFill/>
-          <a:ln>
-            <a:noFill/>
-          </a:ln>
-        </p:spPr>
-        <p:txBody>
-          <a:bodyPr anchorCtr="0" anchor="t" bIns="91425" lIns="91425" rIns="91425" wrap="square" tIns="91425">
-            <a:noAutofit/>
-          </a:bodyPr>
-          <a:lstStyle/>
-          <a:p>
-            <a:pPr lvl="0">
-              <a:spcBef>
-                <a:spcPts val="0"/>
-              </a:spcBef>
-              <a:buNone/>
-            </a:pPr>
-            <a:r>
-              <a:rPr lang="en-US" sz="3600">
-                <a:latin typeface="Times New Roman"/>
-                <a:ea typeface="Times New Roman"/>
-                <a:cs typeface="Times New Roman"/>
-                <a:sym typeface="Times New Roman"/>
-              </a:rPr>
-              <a:t>Main</a:t>
-            </a:r>
-          </a:p>
-        </p:txBody>
-      </p:sp>
-      <p:cxnSp>
-        <p:nvCxnSpPr>
-          <p:cNvPr id="132" name="Shape 132"/>
-          <p:cNvCxnSpPr/>
-          <p:nvPr/>
-        </p:nvCxnSpPr>
-        <p:spPr>
-          <a:xfrm rot="10800000">
-            <a:off x="2479300" y="2319850"/>
-            <a:ext cx="217500" cy="1275900"/>
-          </a:xfrm>
-          <a:prstGeom prst="straightConnector1">
-            <a:avLst/>
-          </a:prstGeom>
-          <a:noFill/>
-          <a:ln cap="flat" cmpd="sng" w="76200">
-            <a:solidFill>
-              <a:srgbClr val="FF0000"/>
-            </a:solidFill>
-            <a:prstDash val="solid"/>
-            <a:round/>
-            <a:headEnd len="lg" w="lg" type="none"/>
-            <a:tailEnd len="lg" w="lg" type="triangle"/>
-          </a:ln>
-        </p:spPr>
-      </p:cxnSp>
-      <p:cxnSp>
-        <p:nvCxnSpPr>
-          <p:cNvPr id="133" name="Shape 133"/>
-          <p:cNvCxnSpPr/>
-          <p:nvPr/>
-        </p:nvCxnSpPr>
-        <p:spPr>
-          <a:xfrm flipH="1" rot="10800000">
-            <a:off x="9380825" y="2305450"/>
-            <a:ext cx="208500" cy="1304700"/>
-          </a:xfrm>
-          <a:prstGeom prst="straightConnector1">
-            <a:avLst/>
-          </a:prstGeom>
-          <a:noFill/>
-          <a:ln cap="flat" cmpd="sng" w="76200">
-            <a:solidFill>
-              <a:srgbClr val="FF0000"/>
-            </a:solidFill>
-            <a:prstDash val="solid"/>
-            <a:round/>
-            <a:headEnd len="lg" w="lg" type="none"/>
-            <a:tailEnd len="lg" w="lg" type="triangle"/>
-          </a:ln>
-        </p:spPr>
-      </p:cxnSp>
-      <p:sp>
-        <p:nvSpPr>
-          <p:cNvPr id="134" name="Shape 134"/>
-          <p:cNvSpPr txBox="1"/>
-          <p:nvPr/>
-        </p:nvSpPr>
-        <p:spPr>
-          <a:xfrm>
-            <a:off x="1529650" y="3682725"/>
+            <a:off x="1438350" y="2189350"/>
             <a:ext cx="2116800" cy="652500"/>
           </a:xfrm>
           <a:prstGeom prst="rect">
@@ -14170,7 +14216,7 @@
           </a:bodyPr>
           <a:lstStyle/>
           <a:p>
-            <a:pPr lvl="0" algn="ctr">
+            <a:pPr indent="0" lvl="0" marL="0" algn="ctr">
               <a:spcBef>
                 <a:spcPts val="0"/>
               </a:spcBef>
@@ -14190,13 +14236,13 @@
       </p:sp>
       <p:sp>
         <p:nvSpPr>
-          <p:cNvPr id="135" name="Shape 135"/>
+          <p:cNvPr id="133" name="Shape 133"/>
           <p:cNvSpPr txBox="1"/>
           <p:nvPr/>
         </p:nvSpPr>
         <p:spPr>
           <a:xfrm>
-            <a:off x="8426675" y="3682725"/>
+            <a:off x="8619625" y="2189350"/>
             <a:ext cx="2116800" cy="652500"/>
           </a:xfrm>
           <a:prstGeom prst="rect">
@@ -14213,7 +14259,7 @@
           </a:bodyPr>
           <a:lstStyle/>
           <a:p>
-            <a:pPr lvl="0" rtl="0" algn="ctr">
+            <a:pPr indent="0" lvl="0" marL="0" rtl="0" algn="ctr">
               <a:spcBef>
                 <a:spcPts val="0"/>
               </a:spcBef>
@@ -14233,17 +14279,16 @@
       </p:sp>
       <p:cxnSp>
         <p:nvCxnSpPr>
-          <p:cNvPr id="136" name="Shape 136"/>
+          <p:cNvPr id="134" name="Shape 134"/>
           <p:cNvCxnSpPr>
             <a:stCxn id="127" idx="3"/>
-            <a:endCxn id="128" idx="0"/>
           </p:cNvCxnSpPr>
           <p:nvPr/>
         </p:nvCxnSpPr>
         <p:spPr>
           <a:xfrm>
             <a:off x="3888600" y="1928400"/>
-            <a:ext cx="2024100" cy="1522500"/>
+            <a:ext cx="1055400" cy="1594800"/>
           </a:xfrm>
           <a:prstGeom prst="straightConnector1">
             <a:avLst/>
@@ -14276,7 +14321,7 @@
   <p:cSld>
     <p:spTree>
       <p:nvGrpSpPr>
-        <p:cNvPr id="140" name="Shape 140"/>
+        <p:cNvPr id="138" name="Shape 138"/>
         <p:cNvGrpSpPr/>
         <p:nvPr/>
       </p:nvGrpSpPr>
@@ -14290,7 +14335,7 @@
       </p:grpSpPr>
       <p:sp>
         <p:nvSpPr>
-          <p:cNvPr id="141" name="Shape 141"/>
+          <p:cNvPr id="139" name="Shape 139"/>
           <p:cNvSpPr txBox="1"/>
           <p:nvPr>
             <p:ph type="title"/>
@@ -14346,7 +14391,7 @@
       </p:sp>
       <p:sp>
         <p:nvSpPr>
-          <p:cNvPr id="142" name="Shape 142"/>
+          <p:cNvPr id="140" name="Shape 140"/>
           <p:cNvSpPr txBox="1"/>
           <p:nvPr/>
         </p:nvSpPr>
@@ -14503,7 +14548,7 @@
             </a:r>
           </a:p>
           <a:p>
-            <a:pPr lvl="0">
+            <a:pPr indent="0" lvl="0" marL="0">
               <a:spcBef>
                 <a:spcPts val="0"/>
               </a:spcBef>
@@ -14532,7 +14577,7 @@
   <p:cSld>
     <p:spTree>
       <p:nvGrpSpPr>
-        <p:cNvPr id="146" name="Shape 146"/>
+        <p:cNvPr id="144" name="Shape 144"/>
         <p:cNvGrpSpPr/>
         <p:nvPr/>
       </p:nvGrpSpPr>
@@ -14546,7 +14591,7 @@
       </p:grpSpPr>
       <p:sp>
         <p:nvSpPr>
-          <p:cNvPr id="147" name="Shape 147"/>
+          <p:cNvPr id="145" name="Shape 145"/>
           <p:cNvSpPr txBox="1"/>
           <p:nvPr>
             <p:ph type="title"/>
@@ -14614,7 +14659,7 @@
       </p:sp>
       <p:sp>
         <p:nvSpPr>
-          <p:cNvPr id="148" name="Shape 148"/>
+          <p:cNvPr id="146" name="Shape 146"/>
           <p:cNvSpPr txBox="1"/>
           <p:nvPr/>
         </p:nvSpPr>
@@ -14637,7 +14682,7 @@
           </a:bodyPr>
           <a:lstStyle/>
           <a:p>
-            <a:pPr lvl="0" rtl="0">
+            <a:pPr indent="0" lvl="0" marL="0" rtl="0">
               <a:spcBef>
                 <a:spcPts val="0"/>
               </a:spcBef>
@@ -14652,10 +14697,6 @@
               <a:t> citation styles (MLA, CHICAGO, APA)</a:t>
             </a:r>
             <a:r>
-              <a:rPr b="1" lang="en-US" sz="2000"/>
-              <a:t> </a:t>
-            </a:r>
-            <a:r>
               <a:rPr b="1" lang="en-US" sz="2000">
                 <a:solidFill>
                   <a:srgbClr val="FF0000"/>
@@ -14677,7 +14718,7 @@
             </a:r>
           </a:p>
           <a:p>
-            <a:pPr lvl="0" rtl="0">
+            <a:pPr indent="0" lvl="0" marL="0" rtl="0">
               <a:spcBef>
                 <a:spcPts val="0"/>
               </a:spcBef>
@@ -14689,7 +14730,7 @@
             <a:endParaRPr b="1" sz="2000"/>
           </a:p>
           <a:p>
-            <a:pPr lvl="0" rtl="0">
+            <a:pPr indent="0" lvl="0" marL="0" rtl="0">
               <a:spcBef>
                 <a:spcPts val="0"/>
               </a:spcBef>
@@ -14701,7 +14742,7 @@
             <a:endParaRPr b="1" sz="2000"/>
           </a:p>
           <a:p>
-            <a:pPr lvl="0" rtl="0">
+            <a:pPr indent="0" lvl="0" marL="0" rtl="0">
               <a:spcBef>
                 <a:spcPts val="0"/>
               </a:spcBef>
@@ -14713,7 +14754,7 @@
             </a:r>
             <a:r>
               <a:rPr lang="en-US" sz="2000"/>
-              <a:t>book &gt; whole or section &gt; physical or online, journal &gt; whole or single article &gt; physical or online, website </a:t>
+              <a:t>book &gt; whole or section &gt; physical or online, journal &gt; whole or single article &gt; physical or online, website</a:t>
             </a:r>
             <a:r>
               <a:rPr b="1" lang="en-US" sz="2000">
@@ -14737,7 +14778,7 @@
             </a:r>
           </a:p>
           <a:p>
-            <a:pPr lvl="0" rtl="0">
+            <a:pPr indent="0" lvl="0" marL="0" rtl="0">
               <a:spcBef>
                 <a:spcPts val="0"/>
               </a:spcBef>
@@ -14753,7 +14794,7 @@
             </a:endParaRPr>
           </a:p>
           <a:p>
-            <a:pPr lvl="0" rtl="0">
+            <a:pPr indent="0" lvl="0" marL="0" rtl="0">
               <a:spcBef>
                 <a:spcPts val="0"/>
               </a:spcBef>
@@ -14769,7 +14810,7 @@
             </a:endParaRPr>
           </a:p>
           <a:p>
-            <a:pPr lvl="0" rtl="0">
+            <a:pPr indent="0" lvl="0" marL="0" rtl="0">
               <a:spcBef>
                 <a:spcPts val="0"/>
               </a:spcBef>
@@ -14782,14 +14823,6 @@
             <a:r>
               <a:rPr b="1" lang="en-US" sz="2000">
                 <a:solidFill>
-                  <a:srgbClr val="274E13"/>
-                </a:solidFill>
-              </a:rPr>
-              <a:t> </a:t>
-            </a:r>
-            <a:r>
-              <a:rPr b="1" lang="en-US" sz="2000">
-                <a:solidFill>
                   <a:srgbClr val="FF0000"/>
                 </a:solidFill>
               </a:rPr>
@@ -14813,7 +14846,7 @@
             </a:r>
           </a:p>
           <a:p>
-            <a:pPr lvl="0" rtl="0">
+            <a:pPr indent="0" lvl="0" marL="0" rtl="0">
               <a:spcBef>
                 <a:spcPts val="0"/>
               </a:spcBef>
@@ -14825,7 +14858,7 @@
             <a:endParaRPr b="1" sz="2000"/>
           </a:p>
           <a:p>
-            <a:pPr lvl="0" rtl="0">
+            <a:pPr indent="0" lvl="0" marL="0" rtl="0">
               <a:spcBef>
                 <a:spcPts val="0"/>
               </a:spcBef>
@@ -14837,7 +14870,7 @@
             <a:endParaRPr b="1" sz="2000"/>
           </a:p>
           <a:p>
-            <a:pPr lvl="0" rtl="0">
+            <a:pPr indent="0" lvl="0" marL="0" rtl="0">
               <a:spcBef>
                 <a:spcPts val="0"/>
               </a:spcBef>
@@ -14846,10 +14879,6 @@
             <a:r>
               <a:rPr lang="en-US" sz="2000"/>
               <a:t>Citation output in Main</a:t>
-            </a:r>
-            <a:r>
-              <a:rPr b="1" lang="en-US" sz="2000"/>
-              <a:t> </a:t>
             </a:r>
             <a:r>
               <a:rPr b="1" lang="en-US" sz="2000">
@@ -14890,7 +14919,7 @@
   <p:cSld>
     <p:spTree>
       <p:nvGrpSpPr>
-        <p:cNvPr id="152" name="Shape 152"/>
+        <p:cNvPr id="150" name="Shape 150"/>
         <p:cNvGrpSpPr/>
         <p:nvPr/>
       </p:nvGrpSpPr>
@@ -14904,7 +14933,7 @@
       </p:grpSpPr>
       <p:sp>
         <p:nvSpPr>
-          <p:cNvPr id="153" name="Shape 153"/>
+          <p:cNvPr id="151" name="Shape 151"/>
           <p:cNvSpPr txBox="1"/>
           <p:nvPr>
             <p:ph type="title"/>
@@ -14944,17 +14973,224 @@
               <a:buNone/>
             </a:pPr>
             <a:r>
-              <a:rPr i="0" lang="en-US" sz="4400" u="none" cap="none" strike="noStrike">
-                <a:solidFill>
-                  <a:schemeClr val="dk1"/>
-                </a:solidFill>
+              <a:rPr lang="en-US" sz="4400">
                 <a:latin typeface="Times New Roman"/>
                 <a:ea typeface="Times New Roman"/>
                 <a:cs typeface="Times New Roman"/>
                 <a:sym typeface="Times New Roman"/>
               </a:rPr>
-              <a:t>TESTING &amp;</a:t>
+              <a:t>LET’S TEST!</a:t>
             </a:r>
+          </a:p>
+        </p:txBody>
+      </p:sp>
+      <p:sp>
+        <p:nvSpPr>
+          <p:cNvPr id="152" name="Shape 152"/>
+          <p:cNvSpPr txBox="1"/>
+          <p:nvPr/>
+        </p:nvSpPr>
+        <p:spPr>
+          <a:xfrm>
+            <a:off x="6693150" y="1871350"/>
+            <a:ext cx="4270800" cy="4219800"/>
+          </a:xfrm>
+          <a:prstGeom prst="rect">
+            <a:avLst/>
+          </a:prstGeom>
+          <a:noFill/>
+          <a:ln>
+            <a:noFill/>
+          </a:ln>
+        </p:spPr>
+        <p:txBody>
+          <a:bodyPr anchorCtr="0" anchor="ctr" bIns="91425" lIns="91425" rIns="91425" wrap="square" tIns="91425">
+            <a:noAutofit/>
+          </a:bodyPr>
+          <a:lstStyle/>
+          <a:p>
+            <a:pPr indent="0" lvl="0" marL="0" rtl="0" algn="ctr">
+              <a:spcBef>
+                <a:spcPts val="0"/>
+              </a:spcBef>
+              <a:buNone/>
+            </a:pPr>
+            <a:r>
+              <a:rPr b="1" lang="en-US" sz="1800" u="sng"/>
+              <a:t>Final Round</a:t>
+            </a:r>
+          </a:p>
+          <a:p>
+            <a:pPr indent="0" lvl="0" marL="0" algn="ctr">
+              <a:spcBef>
+                <a:spcPts val="0"/>
+              </a:spcBef>
+              <a:buNone/>
+            </a:pPr>
+            <a:r>
+              <a:t/>
+            </a:r>
+            <a:endParaRPr b="1" sz="1800" u="sng"/>
+          </a:p>
+          <a:p>
+            <a:pPr indent="0" lvl="0" marL="0">
+              <a:spcBef>
+                <a:spcPts val="0"/>
+              </a:spcBef>
+              <a:buNone/>
+            </a:pPr>
+            <a:r>
+              <a:rPr lang="en-US" sz="1800"/>
+              <a:t>One book - success, but citation printed twice because we forgot to remove old code </a:t>
+            </a:r>
+          </a:p>
+          <a:p>
+            <a:pPr indent="0" lvl="0" marL="0">
+              <a:spcBef>
+                <a:spcPts val="0"/>
+              </a:spcBef>
+              <a:buNone/>
+            </a:pPr>
+            <a:r>
+              <a:t/>
+            </a:r>
+            <a:endParaRPr sz="1800"/>
+          </a:p>
+          <a:p>
+            <a:pPr indent="0" lvl="0" marL="0">
+              <a:spcBef>
+                <a:spcPts val="0"/>
+              </a:spcBef>
+              <a:buNone/>
+            </a:pPr>
+            <a:r>
+              <a:rPr lang="en-US" sz="1800"/>
+              <a:t>One book, one website - success, but we were using the character code for curly quotes and those were not displaying correctly</a:t>
+            </a:r>
+          </a:p>
+          <a:p>
+            <a:pPr indent="0" lvl="0" marL="0">
+              <a:spcBef>
+                <a:spcPts val="0"/>
+              </a:spcBef>
+              <a:buNone/>
+            </a:pPr>
+            <a:r>
+              <a:t/>
+            </a:r>
+            <a:endParaRPr sz="1800"/>
+          </a:p>
+          <a:p>
+            <a:pPr indent="0" lvl="0" marL="0">
+              <a:spcBef>
+                <a:spcPts val="0"/>
+              </a:spcBef>
+              <a:buNone/>
+            </a:pPr>
+            <a:r>
+              <a:rPr lang="en-US" sz="1800"/>
+              <a:t>Several books and several websites some without publishers as well as some without publish dates - success</a:t>
+            </a:r>
+          </a:p>
+        </p:txBody>
+      </p:sp>
+      <p:pic>
+        <p:nvPicPr>
+          <p:cNvPr id="153" name="Shape 153"/>
+          <p:cNvPicPr preferRelativeResize="0"/>
+          <p:nvPr/>
+        </p:nvPicPr>
+        <p:blipFill>
+          <a:blip r:embed="rId3">
+            <a:alphaModFix/>
+          </a:blip>
+          <a:stretch>
+            <a:fillRect/>
+          </a:stretch>
+        </p:blipFill>
+        <p:spPr>
+          <a:xfrm>
+            <a:off x="197850" y="1871350"/>
+            <a:ext cx="6105725" cy="4219725"/>
+          </a:xfrm>
+          <a:prstGeom prst="rect">
+            <a:avLst/>
+          </a:prstGeom>
+          <a:noFill/>
+          <a:ln>
+            <a:noFill/>
+          </a:ln>
+        </p:spPr>
+      </p:pic>
+    </p:spTree>
+  </p:cSld>
+  <p:clrMapOvr>
+    <a:masterClrMapping/>
+  </p:clrMapOvr>
+  <p:transition spd="slow">
+    <p:fade thruBlk="1"/>
+  </p:transition>
+</p:sld>
+</file>
+
+<file path=ppt/slides/slide6.xml><?xml version="1.0" encoding="utf-8"?>
+<p:sld xmlns:a="http://schemas.openxmlformats.org/drawingml/2006/main" xmlns:r="http://schemas.openxmlformats.org/officeDocument/2006/relationships" xmlns:mc="http://schemas.openxmlformats.org/markup-compatibility/2006" xmlns:mv="urn:schemas-microsoft-com:mac:vml" xmlns:p="http://schemas.openxmlformats.org/presentationml/2006/main" xmlns:c="http://schemas.openxmlformats.org/drawingml/2006/chart" xmlns:dgm="http://schemas.openxmlformats.org/drawingml/2006/diagram" xmlns:o="urn:schemas-microsoft-com:office:office" xmlns:v="urn:schemas-microsoft-com:vml" xmlns:pvml="urn:schemas-microsoft-com:office:powerpoint" xmlns:com="http://schemas.openxmlformats.org/drawingml/2006/compatibility" xmlns:p14="http://schemas.microsoft.com/office/powerpoint/2010/main" xmlns:p15="http://schemas.microsoft.com/office/powerpoint/2012/main">
+  <p:cSld>
+    <p:spTree>
+      <p:nvGrpSpPr>
+        <p:cNvPr id="157" name="Shape 157"/>
+        <p:cNvGrpSpPr/>
+        <p:nvPr/>
+      </p:nvGrpSpPr>
+      <p:grpSpPr>
+        <a:xfrm>
+          <a:off x="0" y="0"/>
+          <a:ext cx="0" cy="0"/>
+          <a:chOff x="0" y="0"/>
+          <a:chExt cx="0" cy="0"/>
+        </a:xfrm>
+      </p:grpSpPr>
+      <p:sp>
+        <p:nvSpPr>
+          <p:cNvPr id="158" name="Shape 158"/>
+          <p:cNvSpPr txBox="1"/>
+          <p:nvPr>
+            <p:ph type="title"/>
+          </p:nvPr>
+        </p:nvSpPr>
+        <p:spPr>
+          <a:xfrm>
+            <a:off x="1104900" y="76200"/>
+            <a:ext cx="9980700" cy="1097100"/>
+          </a:xfrm>
+          <a:prstGeom prst="rect">
+            <a:avLst/>
+          </a:prstGeom>
+          <a:noFill/>
+          <a:ln>
+            <a:noFill/>
+          </a:ln>
+        </p:spPr>
+        <p:txBody>
+          <a:bodyPr anchorCtr="0" anchor="b" bIns="45700" lIns="0" rIns="0" wrap="square" tIns="45700">
+            <a:noAutofit/>
+          </a:bodyPr>
+          <a:lstStyle/>
+          <a:p>
+            <a:pPr indent="-279400" lvl="0" marL="0" marR="0" rtl="0" algn="ctr">
+              <a:lnSpc>
+                <a:spcPct val="90000"/>
+              </a:lnSpc>
+              <a:spcBef>
+                <a:spcPts val="0"/>
+              </a:spcBef>
+              <a:buClr>
+                <a:schemeClr val="dk1"/>
+              </a:buClr>
+              <a:buSzPts val="4400"/>
+              <a:buFont typeface="Bad Script"/>
+              <a:buNone/>
+            </a:pPr>
             <a:r>
               <a:rPr lang="en-US" sz="4400">
                 <a:latin typeface="Times New Roman"/>
@@ -14962,14 +15198,14 @@
                 <a:cs typeface="Times New Roman"/>
                 <a:sym typeface="Times New Roman"/>
               </a:rPr>
-              <a:t> KEY ISSUES </a:t>
+              <a:t>KEY PROBLEM AREAS</a:t>
             </a:r>
           </a:p>
         </p:txBody>
       </p:sp>
       <p:sp>
         <p:nvSpPr>
-          <p:cNvPr id="154" name="Shape 154"/>
+          <p:cNvPr id="159" name="Shape 159"/>
           <p:cNvSpPr txBox="1"/>
           <p:nvPr/>
         </p:nvSpPr>
@@ -14992,31 +15228,20 @@
           </a:bodyPr>
           <a:lstStyle/>
           <a:p>
-            <a:pPr lvl="0">
-              <a:spcBef>
-                <a:spcPts val="0"/>
-              </a:spcBef>
-              <a:buNone/>
+            <a:pPr indent="-381000" lvl="0" marL="457200" rtl="0">
+              <a:spcBef>
+                <a:spcPts val="0"/>
+              </a:spcBef>
+              <a:buSzPts val="2400"/>
+              <a:buChar char="-"/>
             </a:pPr>
             <a:r>
               <a:rPr lang="en-US" sz="2400"/>
-              <a:t>Testing…</a:t>
+              <a:t>Don’t display the citations in alphabetical order like a bibliography</a:t>
             </a:r>
           </a:p>
           <a:p>
-            <a:pPr lvl="0">
-              <a:spcBef>
-                <a:spcPts val="0"/>
-              </a:spcBef>
-              <a:buNone/>
-            </a:pPr>
-            <a:r>
-              <a:rPr lang="en-US" sz="2400"/>
-              <a:t>	</a:t>
-            </a:r>
-          </a:p>
-          <a:p>
-            <a:pPr lvl="0">
+            <a:pPr indent="0" lvl="0" marL="0" rtl="0">
               <a:spcBef>
                 <a:spcPts val="0"/>
               </a:spcBef>
@@ -15028,47 +15253,20 @@
             <a:endParaRPr sz="2400"/>
           </a:p>
           <a:p>
-            <a:pPr lvl="0">
-              <a:spcBef>
-                <a:spcPts val="0"/>
-              </a:spcBef>
-              <a:buNone/>
+            <a:pPr indent="-381000" lvl="0" marL="457200" rtl="0">
+              <a:spcBef>
+                <a:spcPts val="0"/>
+              </a:spcBef>
+              <a:buSzPts val="2400"/>
+              <a:buChar char="-"/>
             </a:pPr>
             <a:r>
               <a:rPr lang="en-US" sz="2400"/>
-              <a:t>Key Issues</a:t>
-            </a:r>
-            <a:r>
-              <a:rPr lang="en-US" sz="2400"/>
-              <a:t>….</a:t>
+              <a:t>Don’t have all of the detailed tests included for incorrect inputs, such as values, incorrect dates, etc. We focused on logical implementation/flow in order to get a functioning, workable program, without spending too much time on nit-picky catches and exceptions; as advised by Professor Honig.</a:t>
             </a:r>
           </a:p>
           <a:p>
-            <a:pPr indent="457200" lvl="0" rtl="0">
-              <a:spcBef>
-                <a:spcPts val="0"/>
-              </a:spcBef>
-              <a:buNone/>
-            </a:pPr>
-            <a:r>
-              <a:rPr lang="en-US" sz="2400"/>
-              <a:t>getting citations to appear in alphabetical order</a:t>
-            </a:r>
-          </a:p>
-          <a:p>
-            <a:pPr indent="457200" lvl="0" rtl="0">
-              <a:spcBef>
-                <a:spcPts val="0"/>
-              </a:spcBef>
-              <a:buNone/>
-            </a:pPr>
-            <a:r>
-              <a:rPr lang="en-US" sz="2400"/>
-              <a:t>ways to limit user input for date so user enters four-digit year</a:t>
-            </a:r>
-          </a:p>
-          <a:p>
-            <a:pPr lvl="0">
+            <a:pPr indent="0" lvl="0" marL="0" rtl="0">
               <a:spcBef>
                 <a:spcPts val="0"/>
               </a:spcBef>
@@ -15077,7 +15275,45 @@
             <a:r>
               <a:t/>
             </a:r>
-            <a:endParaRPr/>
+            <a:endParaRPr sz="2400"/>
+          </a:p>
+          <a:p>
+            <a:pPr indent="-381000" lvl="0" marL="457200" rtl="0">
+              <a:spcBef>
+                <a:spcPts val="0"/>
+              </a:spcBef>
+              <a:buSzPts val="2400"/>
+              <a:buChar char="-"/>
+            </a:pPr>
+            <a:r>
+              <a:rPr lang="en-US" sz="2400"/>
+              <a:t>Relatively limited scope as compared to the original (quite ambitious) plan.</a:t>
+            </a:r>
+          </a:p>
+          <a:p>
+            <a:pPr indent="0" lvl="0" marL="0" rtl="0">
+              <a:spcBef>
+                <a:spcPts val="0"/>
+              </a:spcBef>
+              <a:buNone/>
+            </a:pPr>
+            <a:r>
+              <a:t/>
+            </a:r>
+            <a:endParaRPr sz="2400"/>
+          </a:p>
+          <a:p>
+            <a:pPr indent="-381000" lvl="0" marL="457200" rtl="0">
+              <a:spcBef>
+                <a:spcPts val="0"/>
+              </a:spcBef>
+              <a:buSzPts val="2400"/>
+              <a:buChar char="-"/>
+            </a:pPr>
+            <a:r>
+              <a:rPr lang="en-US" sz="2400"/>
+              <a:t>Don’t have an option to remove unwanted citations or modify existing ones.</a:t>
+            </a:r>
           </a:p>
         </p:txBody>
       </p:sp>
@@ -15092,12 +15328,12 @@
 </p:sld>
 </file>
 
-<file path=ppt/slides/slide6.xml><?xml version="1.0" encoding="utf-8"?>
+<file path=ppt/slides/slide7.xml><?xml version="1.0" encoding="utf-8"?>
 <p:sld xmlns:a="http://schemas.openxmlformats.org/drawingml/2006/main" xmlns:r="http://schemas.openxmlformats.org/officeDocument/2006/relationships" xmlns:mc="http://schemas.openxmlformats.org/markup-compatibility/2006" xmlns:mv="urn:schemas-microsoft-com:mac:vml" xmlns:p="http://schemas.openxmlformats.org/presentationml/2006/main" xmlns:c="http://schemas.openxmlformats.org/drawingml/2006/chart" xmlns:dgm="http://schemas.openxmlformats.org/drawingml/2006/diagram" xmlns:o="urn:schemas-microsoft-com:office:office" xmlns:v="urn:schemas-microsoft-com:vml" xmlns:pvml="urn:schemas-microsoft-com:office:powerpoint" xmlns:com="http://schemas.openxmlformats.org/drawingml/2006/compatibility" xmlns:p14="http://schemas.microsoft.com/office/powerpoint/2010/main" xmlns:p15="http://schemas.microsoft.com/office/powerpoint/2012/main">
   <p:cSld>
     <p:spTree>
       <p:nvGrpSpPr>
-        <p:cNvPr id="158" name="Shape 158"/>
+        <p:cNvPr id="163" name="Shape 163"/>
         <p:cNvGrpSpPr/>
         <p:nvPr/>
       </p:nvGrpSpPr>
@@ -15111,7 +15347,7 @@
       </p:grpSpPr>
       <p:sp>
         <p:nvSpPr>
-          <p:cNvPr id="159" name="Shape 159"/>
+          <p:cNvPr id="164" name="Shape 164"/>
           <p:cNvSpPr txBox="1"/>
           <p:nvPr>
             <p:ph type="title"/>
@@ -15167,7 +15403,7 @@
       </p:sp>
       <p:sp>
         <p:nvSpPr>
-          <p:cNvPr id="160" name="Shape 160"/>
+          <p:cNvPr id="165" name="Shape 165"/>
           <p:cNvSpPr txBox="1"/>
           <p:nvPr/>
         </p:nvSpPr>
@@ -15203,7 +15439,7 @@
             </a:r>
           </a:p>
           <a:p>
-            <a:pPr lvl="0" rtl="0">
+            <a:pPr indent="0" lvl="0" marL="0" rtl="0">
               <a:spcBef>
                 <a:spcPts val="0"/>
               </a:spcBef>
@@ -15228,7 +15464,7 @@
             </a:r>
           </a:p>
           <a:p>
-            <a:pPr lvl="0">
+            <a:pPr indent="0" lvl="0" marL="0">
               <a:spcBef>
                 <a:spcPts val="0"/>
               </a:spcBef>
@@ -15240,7 +15476,7 @@
             <a:endParaRPr sz="2400"/>
           </a:p>
           <a:p>
-            <a:pPr lvl="0">
+            <a:pPr indent="0" lvl="0" marL="0">
               <a:spcBef>
                 <a:spcPts val="0"/>
               </a:spcBef>
@@ -15252,7 +15488,7 @@
             </a:r>
           </a:p>
           <a:p>
-            <a:pPr lvl="0">
+            <a:pPr indent="0" lvl="0" marL="0">
               <a:spcBef>
                 <a:spcPts val="0"/>
               </a:spcBef>
@@ -15264,7 +15500,7 @@
             <a:endParaRPr sz="2400"/>
           </a:p>
           <a:p>
-            <a:pPr lvl="0">
+            <a:pPr indent="0" lvl="0" marL="0">
               <a:spcBef>
                 <a:spcPts val="0"/>
               </a:spcBef>

</xml_diff>